<commit_message>
pushing android final code
</commit_message>
<xml_diff>
--- a/Writings/Final.pptx
+++ b/Writings/Final.pptx
@@ -10,6 +10,15 @@
     <p:sldId id="260" r:id="rId4"/>
     <p:sldId id="258" r:id="rId5"/>
     <p:sldId id="259" r:id="rId6"/>
+    <p:sldId id="261" r:id="rId7"/>
+    <p:sldId id="262" r:id="rId8"/>
+    <p:sldId id="263" r:id="rId9"/>
+    <p:sldId id="264" r:id="rId10"/>
+    <p:sldId id="265" r:id="rId11"/>
+    <p:sldId id="269" r:id="rId12"/>
+    <p:sldId id="266" r:id="rId13"/>
+    <p:sldId id="270" r:id="rId14"/>
+    <p:sldId id="267" r:id="rId15"/>
   </p:sldIdLst>
   <p:sldSz cx="12192000" cy="6858000"/>
   <p:notesSz cx="6858000" cy="9144000"/>
@@ -116,6 +125,1291 @@
 </p:presentation>
 </file>
 
+<file path=ppt/charts/chart1.xml><?xml version="1.0" encoding="utf-8"?>
+<c:chartSpace xmlns:c="http://schemas.openxmlformats.org/drawingml/2006/chart" xmlns:a="http://schemas.openxmlformats.org/drawingml/2006/main" xmlns:r="http://schemas.openxmlformats.org/officeDocument/2006/relationships" xmlns:c16r2="http://schemas.microsoft.com/office/drawing/2015/06/chart">
+  <c:date1904 val="0"/>
+  <c:lang val="en-US"/>
+  <c:roundedCorners val="0"/>
+  <mc:AlternateContent xmlns:mc="http://schemas.openxmlformats.org/markup-compatibility/2006">
+    <mc:Choice xmlns:c14="http://schemas.microsoft.com/office/drawing/2007/8/2/chart" Requires="c14">
+      <c14:style val="102"/>
+    </mc:Choice>
+    <mc:Fallback>
+      <c:style val="2"/>
+    </mc:Fallback>
+  </mc:AlternateContent>
+  <c:chart>
+    <c:title>
+      <c:tx>
+        <c:rich>
+          <a:bodyPr rot="0" spcFirstLastPara="1" vertOverflow="ellipsis" vert="horz" wrap="square" anchor="ctr" anchorCtr="1"/>
+          <a:lstStyle/>
+          <a:p>
+            <a:pPr>
+              <a:defRPr sz="1400" b="0" i="0" u="none" strike="noStrike" kern="1200" spc="0" baseline="0">
+                <a:solidFill>
+                  <a:schemeClr val="tx1">
+                    <a:lumMod val="65000"/>
+                    <a:lumOff val="35000"/>
+                  </a:schemeClr>
+                </a:solidFill>
+                <a:latin typeface="+mn-lt"/>
+                <a:ea typeface="+mn-ea"/>
+                <a:cs typeface="+mn-cs"/>
+              </a:defRPr>
+            </a:pPr>
+            <a:r>
+              <a:rPr lang="en-US"/>
+              <a:t>Cosine Similarity Angle</a:t>
+            </a:r>
+          </a:p>
+        </c:rich>
+      </c:tx>
+      <c:overlay val="0"/>
+      <c:spPr>
+        <a:noFill/>
+        <a:ln>
+          <a:noFill/>
+        </a:ln>
+        <a:effectLst/>
+      </c:spPr>
+      <c:txPr>
+        <a:bodyPr rot="0" spcFirstLastPara="1" vertOverflow="ellipsis" vert="horz" wrap="square" anchor="ctr" anchorCtr="1"/>
+        <a:lstStyle/>
+        <a:p>
+          <a:pPr>
+            <a:defRPr sz="1400" b="0" i="0" u="none" strike="noStrike" kern="1200" spc="0" baseline="0">
+              <a:solidFill>
+                <a:schemeClr val="tx1">
+                  <a:lumMod val="65000"/>
+                  <a:lumOff val="35000"/>
+                </a:schemeClr>
+              </a:solidFill>
+              <a:latin typeface="+mn-lt"/>
+              <a:ea typeface="+mn-ea"/>
+              <a:cs typeface="+mn-cs"/>
+            </a:defRPr>
+          </a:pPr>
+          <a:endParaRPr lang="en-US"/>
+        </a:p>
+      </c:txPr>
+    </c:title>
+    <c:autoTitleDeleted val="0"/>
+    <c:plotArea>
+      <c:layout/>
+      <c:lineChart>
+        <c:grouping val="standard"/>
+        <c:varyColors val="0"/>
+        <c:ser>
+          <c:idx val="0"/>
+          <c:order val="0"/>
+          <c:tx>
+            <c:strRef>
+              <c:f>Sheet1!$B$1</c:f>
+              <c:strCache>
+                <c:ptCount val="1"/>
+                <c:pt idx="0">
+                  <c:v>Similarity Degree</c:v>
+                </c:pt>
+              </c:strCache>
+            </c:strRef>
+          </c:tx>
+          <c:spPr>
+            <a:ln w="28575" cap="rnd">
+              <a:solidFill>
+                <a:schemeClr val="accent1"/>
+              </a:solidFill>
+              <a:round/>
+            </a:ln>
+            <a:effectLst/>
+          </c:spPr>
+          <c:marker>
+            <c:symbol val="none"/>
+          </c:marker>
+          <c:cat>
+            <c:numRef>
+              <c:f>Sheet1!$A$2:$A$22</c:f>
+              <c:numCache>
+                <c:formatCode>General</c:formatCode>
+                <c:ptCount val="21"/>
+                <c:pt idx="0">
+                  <c:v>0</c:v>
+                </c:pt>
+                <c:pt idx="1">
+                  <c:v>1</c:v>
+                </c:pt>
+                <c:pt idx="2">
+                  <c:v>2</c:v>
+                </c:pt>
+                <c:pt idx="3">
+                  <c:v>3</c:v>
+                </c:pt>
+                <c:pt idx="4">
+                  <c:v>4</c:v>
+                </c:pt>
+                <c:pt idx="5">
+                  <c:v>5</c:v>
+                </c:pt>
+                <c:pt idx="6">
+                  <c:v>6</c:v>
+                </c:pt>
+                <c:pt idx="7">
+                  <c:v>7</c:v>
+                </c:pt>
+                <c:pt idx="8">
+                  <c:v>8</c:v>
+                </c:pt>
+                <c:pt idx="9">
+                  <c:v>9</c:v>
+                </c:pt>
+                <c:pt idx="10">
+                  <c:v>10</c:v>
+                </c:pt>
+                <c:pt idx="11">
+                  <c:v>11</c:v>
+                </c:pt>
+                <c:pt idx="12">
+                  <c:v>12</c:v>
+                </c:pt>
+                <c:pt idx="13">
+                  <c:v>13</c:v>
+                </c:pt>
+                <c:pt idx="14">
+                  <c:v>14</c:v>
+                </c:pt>
+                <c:pt idx="15">
+                  <c:v>15</c:v>
+                </c:pt>
+                <c:pt idx="16">
+                  <c:v>16</c:v>
+                </c:pt>
+                <c:pt idx="17">
+                  <c:v>17</c:v>
+                </c:pt>
+                <c:pt idx="18">
+                  <c:v>18</c:v>
+                </c:pt>
+                <c:pt idx="19">
+                  <c:v>19</c:v>
+                </c:pt>
+                <c:pt idx="20">
+                  <c:v>20</c:v>
+                </c:pt>
+              </c:numCache>
+            </c:numRef>
+          </c:cat>
+          <c:val>
+            <c:numRef>
+              <c:f>Sheet1!$B$2:$B$22</c:f>
+              <c:numCache>
+                <c:formatCode>General</c:formatCode>
+                <c:ptCount val="21"/>
+                <c:pt idx="0">
+                  <c:v>6.5561999999999996</c:v>
+                </c:pt>
+                <c:pt idx="1">
+                  <c:v>7.7634999999999996</c:v>
+                </c:pt>
+                <c:pt idx="2">
+                  <c:v>8.1685999999999996</c:v>
+                </c:pt>
+                <c:pt idx="3">
+                  <c:v>13.387</c:v>
+                </c:pt>
+                <c:pt idx="4">
+                  <c:v>5.9356600000000004</c:v>
+                </c:pt>
+                <c:pt idx="5">
+                  <c:v>9.7744999999999997</c:v>
+                </c:pt>
+                <c:pt idx="6">
+                  <c:v>11.633559999999999</c:v>
+                </c:pt>
+                <c:pt idx="7">
+                  <c:v>16.008120000000002</c:v>
+                </c:pt>
+                <c:pt idx="8">
+                  <c:v>7.7397355000000001</c:v>
+                </c:pt>
+                <c:pt idx="9">
+                  <c:v>5.1597799999999996</c:v>
+                </c:pt>
+                <c:pt idx="10">
+                  <c:v>16.032463</c:v>
+                </c:pt>
+                <c:pt idx="11">
+                  <c:v>10.179949000000001</c:v>
+                </c:pt>
+                <c:pt idx="12">
+                  <c:v>5.1902200000000001</c:v>
+                </c:pt>
+                <c:pt idx="13">
+                  <c:v>8.3900500000000005</c:v>
+                </c:pt>
+                <c:pt idx="14">
+                  <c:v>12.191431</c:v>
+                </c:pt>
+                <c:pt idx="15">
+                  <c:v>7.6580199999999996</c:v>
+                </c:pt>
+                <c:pt idx="16">
+                  <c:v>7.8084610000000003</c:v>
+                </c:pt>
+                <c:pt idx="17">
+                  <c:v>21.423884999999999</c:v>
+                </c:pt>
+                <c:pt idx="18">
+                  <c:v>13.217980000000001</c:v>
+                </c:pt>
+                <c:pt idx="19">
+                  <c:v>22.56748</c:v>
+                </c:pt>
+                <c:pt idx="20">
+                  <c:v>12.654927000000001</c:v>
+                </c:pt>
+              </c:numCache>
+            </c:numRef>
+          </c:val>
+          <c:smooth val="0"/>
+          <c:extLst>
+            <c:ext xmlns:c16="http://schemas.microsoft.com/office/drawing/2014/chart" uri="{C3380CC4-5D6E-409C-BE32-E72D297353CC}">
+              <c16:uniqueId val="{00000000-DBA1-44CF-8CA1-5554235DBBD8}"/>
+            </c:ext>
+          </c:extLst>
+        </c:ser>
+        <c:ser>
+          <c:idx val="1"/>
+          <c:order val="1"/>
+          <c:tx>
+            <c:strRef>
+              <c:f>Sheet1!$C$1</c:f>
+              <c:strCache>
+                <c:ptCount val="1"/>
+                <c:pt idx="0">
+                  <c:v>Mean</c:v>
+                </c:pt>
+              </c:strCache>
+            </c:strRef>
+          </c:tx>
+          <c:spPr>
+            <a:ln w="28575" cap="rnd">
+              <a:solidFill>
+                <a:schemeClr val="accent2"/>
+              </a:solidFill>
+              <a:round/>
+            </a:ln>
+            <a:effectLst/>
+          </c:spPr>
+          <c:marker>
+            <c:symbol val="none"/>
+          </c:marker>
+          <c:cat>
+            <c:numRef>
+              <c:f>Sheet1!$A$2:$A$22</c:f>
+              <c:numCache>
+                <c:formatCode>General</c:formatCode>
+                <c:ptCount val="21"/>
+                <c:pt idx="0">
+                  <c:v>0</c:v>
+                </c:pt>
+                <c:pt idx="1">
+                  <c:v>1</c:v>
+                </c:pt>
+                <c:pt idx="2">
+                  <c:v>2</c:v>
+                </c:pt>
+                <c:pt idx="3">
+                  <c:v>3</c:v>
+                </c:pt>
+                <c:pt idx="4">
+                  <c:v>4</c:v>
+                </c:pt>
+                <c:pt idx="5">
+                  <c:v>5</c:v>
+                </c:pt>
+                <c:pt idx="6">
+                  <c:v>6</c:v>
+                </c:pt>
+                <c:pt idx="7">
+                  <c:v>7</c:v>
+                </c:pt>
+                <c:pt idx="8">
+                  <c:v>8</c:v>
+                </c:pt>
+                <c:pt idx="9">
+                  <c:v>9</c:v>
+                </c:pt>
+                <c:pt idx="10">
+                  <c:v>10</c:v>
+                </c:pt>
+                <c:pt idx="11">
+                  <c:v>11</c:v>
+                </c:pt>
+                <c:pt idx="12">
+                  <c:v>12</c:v>
+                </c:pt>
+                <c:pt idx="13">
+                  <c:v>13</c:v>
+                </c:pt>
+                <c:pt idx="14">
+                  <c:v>14</c:v>
+                </c:pt>
+                <c:pt idx="15">
+                  <c:v>15</c:v>
+                </c:pt>
+                <c:pt idx="16">
+                  <c:v>16</c:v>
+                </c:pt>
+                <c:pt idx="17">
+                  <c:v>17</c:v>
+                </c:pt>
+                <c:pt idx="18">
+                  <c:v>18</c:v>
+                </c:pt>
+                <c:pt idx="19">
+                  <c:v>19</c:v>
+                </c:pt>
+                <c:pt idx="20">
+                  <c:v>20</c:v>
+                </c:pt>
+              </c:numCache>
+            </c:numRef>
+          </c:cat>
+          <c:val>
+            <c:numRef>
+              <c:f>Sheet1!$C$2:$C$22</c:f>
+              <c:numCache>
+                <c:formatCode>General</c:formatCode>
+                <c:ptCount val="21"/>
+                <c:pt idx="0">
+                  <c:v>10.925786738095237</c:v>
+                </c:pt>
+                <c:pt idx="1">
+                  <c:v>10.925786738095237</c:v>
+                </c:pt>
+                <c:pt idx="2">
+                  <c:v>10.925786738095237</c:v>
+                </c:pt>
+                <c:pt idx="3">
+                  <c:v>10.925786738095237</c:v>
+                </c:pt>
+                <c:pt idx="4">
+                  <c:v>10.925786738095237</c:v>
+                </c:pt>
+                <c:pt idx="5">
+                  <c:v>10.925786738095237</c:v>
+                </c:pt>
+                <c:pt idx="6">
+                  <c:v>10.925786738095237</c:v>
+                </c:pt>
+                <c:pt idx="7">
+                  <c:v>10.925786738095237</c:v>
+                </c:pt>
+                <c:pt idx="8">
+                  <c:v>10.925786738095237</c:v>
+                </c:pt>
+                <c:pt idx="9">
+                  <c:v>10.925786738095237</c:v>
+                </c:pt>
+                <c:pt idx="10">
+                  <c:v>10.925786738095237</c:v>
+                </c:pt>
+                <c:pt idx="11">
+                  <c:v>10.925786738095237</c:v>
+                </c:pt>
+                <c:pt idx="12">
+                  <c:v>10.925786738095237</c:v>
+                </c:pt>
+                <c:pt idx="13">
+                  <c:v>10.925786738095237</c:v>
+                </c:pt>
+                <c:pt idx="14">
+                  <c:v>10.925786738095237</c:v>
+                </c:pt>
+                <c:pt idx="15">
+                  <c:v>10.925786738095237</c:v>
+                </c:pt>
+                <c:pt idx="16">
+                  <c:v>10.925786738095237</c:v>
+                </c:pt>
+                <c:pt idx="17">
+                  <c:v>10.925786738095237</c:v>
+                </c:pt>
+                <c:pt idx="18">
+                  <c:v>10.925786738095237</c:v>
+                </c:pt>
+                <c:pt idx="19">
+                  <c:v>10.925786738095237</c:v>
+                </c:pt>
+                <c:pt idx="20">
+                  <c:v>10.925786738095237</c:v>
+                </c:pt>
+              </c:numCache>
+            </c:numRef>
+          </c:val>
+          <c:smooth val="0"/>
+          <c:extLst>
+            <c:ext xmlns:c16="http://schemas.microsoft.com/office/drawing/2014/chart" uri="{C3380CC4-5D6E-409C-BE32-E72D297353CC}">
+              <c16:uniqueId val="{00000001-DBA1-44CF-8CA1-5554235DBBD8}"/>
+            </c:ext>
+          </c:extLst>
+        </c:ser>
+        <c:dLbls>
+          <c:showLegendKey val="0"/>
+          <c:showVal val="0"/>
+          <c:showCatName val="0"/>
+          <c:showSerName val="0"/>
+          <c:showPercent val="0"/>
+          <c:showBubbleSize val="0"/>
+        </c:dLbls>
+        <c:smooth val="0"/>
+        <c:axId val="535171192"/>
+        <c:axId val="535167672"/>
+      </c:lineChart>
+      <c:catAx>
+        <c:axId val="535171192"/>
+        <c:scaling>
+          <c:orientation val="minMax"/>
+        </c:scaling>
+        <c:delete val="0"/>
+        <c:axPos val="b"/>
+        <c:title>
+          <c:tx>
+            <c:rich>
+              <a:bodyPr rot="0" spcFirstLastPara="1" vertOverflow="ellipsis" vert="horz" wrap="square" anchor="ctr" anchorCtr="1"/>
+              <a:lstStyle/>
+              <a:p>
+                <a:pPr>
+                  <a:defRPr sz="1000" b="0" i="0" u="none" strike="noStrike" kern="1200" baseline="0">
+                    <a:solidFill>
+                      <a:schemeClr val="tx1">
+                        <a:lumMod val="65000"/>
+                        <a:lumOff val="35000"/>
+                      </a:schemeClr>
+                    </a:solidFill>
+                    <a:latin typeface="+mn-lt"/>
+                    <a:ea typeface="+mn-ea"/>
+                    <a:cs typeface="+mn-cs"/>
+                  </a:defRPr>
+                </a:pPr>
+                <a:r>
+                  <a:rPr lang="en-US"/>
+                  <a:t>Users</a:t>
+                </a:r>
+              </a:p>
+            </c:rich>
+          </c:tx>
+          <c:overlay val="0"/>
+          <c:spPr>
+            <a:noFill/>
+            <a:ln>
+              <a:noFill/>
+            </a:ln>
+            <a:effectLst/>
+          </c:spPr>
+          <c:txPr>
+            <a:bodyPr rot="0" spcFirstLastPara="1" vertOverflow="ellipsis" vert="horz" wrap="square" anchor="ctr" anchorCtr="1"/>
+            <a:lstStyle/>
+            <a:p>
+              <a:pPr>
+                <a:defRPr sz="1000" b="0" i="0" u="none" strike="noStrike" kern="1200" baseline="0">
+                  <a:solidFill>
+                    <a:schemeClr val="tx1">
+                      <a:lumMod val="65000"/>
+                      <a:lumOff val="35000"/>
+                    </a:schemeClr>
+                  </a:solidFill>
+                  <a:latin typeface="+mn-lt"/>
+                  <a:ea typeface="+mn-ea"/>
+                  <a:cs typeface="+mn-cs"/>
+                </a:defRPr>
+              </a:pPr>
+              <a:endParaRPr lang="en-US"/>
+            </a:p>
+          </c:txPr>
+        </c:title>
+        <c:numFmt formatCode="General" sourceLinked="1"/>
+        <c:majorTickMark val="none"/>
+        <c:minorTickMark val="none"/>
+        <c:tickLblPos val="nextTo"/>
+        <c:spPr>
+          <a:noFill/>
+          <a:ln w="9525" cap="flat" cmpd="sng" algn="ctr">
+            <a:solidFill>
+              <a:schemeClr val="tx1">
+                <a:lumMod val="15000"/>
+                <a:lumOff val="85000"/>
+              </a:schemeClr>
+            </a:solidFill>
+            <a:round/>
+          </a:ln>
+          <a:effectLst/>
+        </c:spPr>
+        <c:txPr>
+          <a:bodyPr rot="-60000000" spcFirstLastPara="1" vertOverflow="ellipsis" vert="horz" wrap="square" anchor="ctr" anchorCtr="1"/>
+          <a:lstStyle/>
+          <a:p>
+            <a:pPr>
+              <a:defRPr sz="900" b="0" i="0" u="none" strike="noStrike" kern="1200" baseline="0">
+                <a:solidFill>
+                  <a:schemeClr val="tx1">
+                    <a:lumMod val="65000"/>
+                    <a:lumOff val="35000"/>
+                  </a:schemeClr>
+                </a:solidFill>
+                <a:latin typeface="+mn-lt"/>
+                <a:ea typeface="+mn-ea"/>
+                <a:cs typeface="+mn-cs"/>
+              </a:defRPr>
+            </a:pPr>
+            <a:endParaRPr lang="en-US"/>
+          </a:p>
+        </c:txPr>
+        <c:crossAx val="535167672"/>
+        <c:crosses val="autoZero"/>
+        <c:auto val="1"/>
+        <c:lblAlgn val="ctr"/>
+        <c:lblOffset val="100"/>
+        <c:noMultiLvlLbl val="0"/>
+      </c:catAx>
+      <c:valAx>
+        <c:axId val="535167672"/>
+        <c:scaling>
+          <c:orientation val="minMax"/>
+        </c:scaling>
+        <c:delete val="0"/>
+        <c:axPos val="l"/>
+        <c:majorGridlines>
+          <c:spPr>
+            <a:ln w="9525" cap="flat" cmpd="sng" algn="ctr">
+              <a:solidFill>
+                <a:schemeClr val="tx1">
+                  <a:lumMod val="15000"/>
+                  <a:lumOff val="85000"/>
+                </a:schemeClr>
+              </a:solidFill>
+              <a:round/>
+            </a:ln>
+            <a:effectLst/>
+          </c:spPr>
+        </c:majorGridlines>
+        <c:title>
+          <c:tx>
+            <c:rich>
+              <a:bodyPr rot="-5400000" spcFirstLastPara="1" vertOverflow="ellipsis" vert="horz" wrap="square" anchor="ctr" anchorCtr="1"/>
+              <a:lstStyle/>
+              <a:p>
+                <a:pPr>
+                  <a:defRPr sz="1000" b="0" i="0" u="none" strike="noStrike" kern="1200" baseline="0">
+                    <a:solidFill>
+                      <a:schemeClr val="tx1">
+                        <a:lumMod val="65000"/>
+                        <a:lumOff val="35000"/>
+                      </a:schemeClr>
+                    </a:solidFill>
+                    <a:latin typeface="+mn-lt"/>
+                    <a:ea typeface="+mn-ea"/>
+                    <a:cs typeface="+mn-cs"/>
+                  </a:defRPr>
+                </a:pPr>
+                <a:r>
+                  <a:rPr lang="en-US"/>
+                  <a:t>Cosine</a:t>
+                </a:r>
+                <a:r>
+                  <a:rPr lang="en-US" baseline="0"/>
+                  <a:t> Degrees</a:t>
+                </a:r>
+                <a:endParaRPr lang="en-US"/>
+              </a:p>
+            </c:rich>
+          </c:tx>
+          <c:overlay val="0"/>
+          <c:spPr>
+            <a:noFill/>
+            <a:ln>
+              <a:noFill/>
+            </a:ln>
+            <a:effectLst/>
+          </c:spPr>
+          <c:txPr>
+            <a:bodyPr rot="-5400000" spcFirstLastPara="1" vertOverflow="ellipsis" vert="horz" wrap="square" anchor="ctr" anchorCtr="1"/>
+            <a:lstStyle/>
+            <a:p>
+              <a:pPr>
+                <a:defRPr sz="1000" b="0" i="0" u="none" strike="noStrike" kern="1200" baseline="0">
+                  <a:solidFill>
+                    <a:schemeClr val="tx1">
+                      <a:lumMod val="65000"/>
+                      <a:lumOff val="35000"/>
+                    </a:schemeClr>
+                  </a:solidFill>
+                  <a:latin typeface="+mn-lt"/>
+                  <a:ea typeface="+mn-ea"/>
+                  <a:cs typeface="+mn-cs"/>
+                </a:defRPr>
+              </a:pPr>
+              <a:endParaRPr lang="en-US"/>
+            </a:p>
+          </c:txPr>
+        </c:title>
+        <c:numFmt formatCode="General" sourceLinked="1"/>
+        <c:majorTickMark val="none"/>
+        <c:minorTickMark val="none"/>
+        <c:tickLblPos val="nextTo"/>
+        <c:spPr>
+          <a:noFill/>
+          <a:ln>
+            <a:noFill/>
+          </a:ln>
+          <a:effectLst/>
+        </c:spPr>
+        <c:txPr>
+          <a:bodyPr rot="-60000000" spcFirstLastPara="1" vertOverflow="ellipsis" vert="horz" wrap="square" anchor="ctr" anchorCtr="1"/>
+          <a:lstStyle/>
+          <a:p>
+            <a:pPr>
+              <a:defRPr sz="900" b="0" i="0" u="none" strike="noStrike" kern="1200" baseline="0">
+                <a:solidFill>
+                  <a:schemeClr val="tx1">
+                    <a:lumMod val="65000"/>
+                    <a:lumOff val="35000"/>
+                  </a:schemeClr>
+                </a:solidFill>
+                <a:latin typeface="+mn-lt"/>
+                <a:ea typeface="+mn-ea"/>
+                <a:cs typeface="+mn-cs"/>
+              </a:defRPr>
+            </a:pPr>
+            <a:endParaRPr lang="en-US"/>
+          </a:p>
+        </c:txPr>
+        <c:crossAx val="535171192"/>
+        <c:crosses val="autoZero"/>
+        <c:crossBetween val="between"/>
+      </c:valAx>
+      <c:spPr>
+        <a:noFill/>
+        <a:ln>
+          <a:noFill/>
+        </a:ln>
+        <a:effectLst/>
+      </c:spPr>
+    </c:plotArea>
+    <c:legend>
+      <c:legendPos val="b"/>
+      <c:overlay val="0"/>
+      <c:spPr>
+        <a:noFill/>
+        <a:ln>
+          <a:noFill/>
+        </a:ln>
+        <a:effectLst/>
+      </c:spPr>
+      <c:txPr>
+        <a:bodyPr rot="0" spcFirstLastPara="1" vertOverflow="ellipsis" vert="horz" wrap="square" anchor="ctr" anchorCtr="1"/>
+        <a:lstStyle/>
+        <a:p>
+          <a:pPr>
+            <a:defRPr sz="900" b="0" i="0" u="none" strike="noStrike" kern="1200" baseline="0">
+              <a:solidFill>
+                <a:schemeClr val="tx1">
+                  <a:lumMod val="65000"/>
+                  <a:lumOff val="35000"/>
+                </a:schemeClr>
+              </a:solidFill>
+              <a:latin typeface="+mn-lt"/>
+              <a:ea typeface="+mn-ea"/>
+              <a:cs typeface="+mn-cs"/>
+            </a:defRPr>
+          </a:pPr>
+          <a:endParaRPr lang="en-US"/>
+        </a:p>
+      </c:txPr>
+    </c:legend>
+    <c:plotVisOnly val="1"/>
+    <c:dispBlanksAs val="gap"/>
+    <c:showDLblsOverMax val="0"/>
+  </c:chart>
+  <c:spPr>
+    <a:noFill/>
+    <a:ln>
+      <a:noFill/>
+    </a:ln>
+    <a:effectLst/>
+  </c:spPr>
+  <c:txPr>
+    <a:bodyPr/>
+    <a:lstStyle/>
+    <a:p>
+      <a:pPr>
+        <a:defRPr/>
+      </a:pPr>
+      <a:endParaRPr lang="en-US"/>
+    </a:p>
+  </c:txPr>
+  <c:externalData r:id="rId3">
+    <c:autoUpdate val="0"/>
+  </c:externalData>
+</c:chartSpace>
+</file>
+
+<file path=ppt/charts/colors1.xml><?xml version="1.0" encoding="utf-8"?>
+<cs:colorStyle xmlns:cs="http://schemas.microsoft.com/office/drawing/2012/chartStyle" xmlns:a="http://schemas.openxmlformats.org/drawingml/2006/main" meth="cycle" id="10">
+  <a:schemeClr val="accent1"/>
+  <a:schemeClr val="accent2"/>
+  <a:schemeClr val="accent3"/>
+  <a:schemeClr val="accent4"/>
+  <a:schemeClr val="accent5"/>
+  <a:schemeClr val="accent6"/>
+  <cs:variation/>
+  <cs:variation>
+    <a:lumMod val="60000"/>
+  </cs:variation>
+  <cs:variation>
+    <a:lumMod val="80000"/>
+    <a:lumOff val="20000"/>
+  </cs:variation>
+  <cs:variation>
+    <a:lumMod val="80000"/>
+  </cs:variation>
+  <cs:variation>
+    <a:lumMod val="60000"/>
+    <a:lumOff val="40000"/>
+  </cs:variation>
+  <cs:variation>
+    <a:lumMod val="50000"/>
+  </cs:variation>
+  <cs:variation>
+    <a:lumMod val="70000"/>
+    <a:lumOff val="30000"/>
+  </cs:variation>
+  <cs:variation>
+    <a:lumMod val="70000"/>
+  </cs:variation>
+  <cs:variation>
+    <a:lumMod val="50000"/>
+    <a:lumOff val="50000"/>
+  </cs:variation>
+</cs:colorStyle>
+</file>
+
+<file path=ppt/charts/style1.xml><?xml version="1.0" encoding="utf-8"?>
+<cs:chartStyle xmlns:cs="http://schemas.microsoft.com/office/drawing/2012/chartStyle" xmlns:a="http://schemas.openxmlformats.org/drawingml/2006/main" id="227">
+  <cs:axisTitle>
+    <cs:lnRef idx="0"/>
+    <cs:fillRef idx="0"/>
+    <cs:effectRef idx="0"/>
+    <cs:fontRef idx="minor">
+      <a:schemeClr val="tx1">
+        <a:lumMod val="65000"/>
+        <a:lumOff val="35000"/>
+      </a:schemeClr>
+    </cs:fontRef>
+    <cs:defRPr sz="1000" kern="1200"/>
+  </cs:axisTitle>
+  <cs:categoryAxis>
+    <cs:lnRef idx="0"/>
+    <cs:fillRef idx="0"/>
+    <cs:effectRef idx="0"/>
+    <cs:fontRef idx="minor">
+      <a:schemeClr val="tx1">
+        <a:lumMod val="65000"/>
+        <a:lumOff val="35000"/>
+      </a:schemeClr>
+    </cs:fontRef>
+    <cs:spPr>
+      <a:ln w="9525" cap="flat" cmpd="sng" algn="ctr">
+        <a:solidFill>
+          <a:schemeClr val="tx1">
+            <a:lumMod val="15000"/>
+            <a:lumOff val="85000"/>
+          </a:schemeClr>
+        </a:solidFill>
+        <a:round/>
+      </a:ln>
+    </cs:spPr>
+    <cs:defRPr sz="900" kern="1200"/>
+  </cs:categoryAxis>
+  <cs:chartArea mods="allowNoFillOverride allowNoLineOverride">
+    <cs:lnRef idx="0"/>
+    <cs:fillRef idx="0"/>
+    <cs:effectRef idx="0"/>
+    <cs:fontRef idx="minor">
+      <a:schemeClr val="tx1"/>
+    </cs:fontRef>
+    <cs:spPr>
+      <a:solidFill>
+        <a:schemeClr val="bg1"/>
+      </a:solidFill>
+      <a:ln w="9525" cap="flat" cmpd="sng" algn="ctr">
+        <a:solidFill>
+          <a:schemeClr val="tx1">
+            <a:lumMod val="15000"/>
+            <a:lumOff val="85000"/>
+          </a:schemeClr>
+        </a:solidFill>
+        <a:round/>
+      </a:ln>
+    </cs:spPr>
+    <cs:defRPr sz="1000" kern="1200"/>
+  </cs:chartArea>
+  <cs:dataLabel>
+    <cs:lnRef idx="0"/>
+    <cs:fillRef idx="0"/>
+    <cs:effectRef idx="0"/>
+    <cs:fontRef idx="minor">
+      <a:schemeClr val="tx1">
+        <a:lumMod val="75000"/>
+        <a:lumOff val="25000"/>
+      </a:schemeClr>
+    </cs:fontRef>
+    <cs:defRPr sz="900" kern="1200"/>
+  </cs:dataLabel>
+  <cs:dataLabelCallout>
+    <cs:lnRef idx="0"/>
+    <cs:fillRef idx="0"/>
+    <cs:effectRef idx="0"/>
+    <cs:fontRef idx="minor">
+      <a:schemeClr val="dk1">
+        <a:lumMod val="65000"/>
+        <a:lumOff val="35000"/>
+      </a:schemeClr>
+    </cs:fontRef>
+    <cs:spPr>
+      <a:solidFill>
+        <a:schemeClr val="lt1"/>
+      </a:solidFill>
+      <a:ln>
+        <a:solidFill>
+          <a:schemeClr val="dk1">
+            <a:lumMod val="25000"/>
+            <a:lumOff val="75000"/>
+          </a:schemeClr>
+        </a:solidFill>
+      </a:ln>
+    </cs:spPr>
+    <cs:defRPr sz="900" kern="1200"/>
+    <cs:bodyPr rot="0" spcFirstLastPara="1" vertOverflow="clip" horzOverflow="clip" vert="horz" wrap="square" lIns="36576" tIns="18288" rIns="36576" bIns="18288" anchor="ctr" anchorCtr="1">
+      <a:spAutoFit/>
+    </cs:bodyPr>
+  </cs:dataLabelCallout>
+  <cs:dataPoint>
+    <cs:lnRef idx="0"/>
+    <cs:fillRef idx="1">
+      <cs:styleClr val="auto"/>
+    </cs:fillRef>
+    <cs:effectRef idx="0"/>
+    <cs:fontRef idx="minor">
+      <a:schemeClr val="tx1"/>
+    </cs:fontRef>
+    <cs:spPr>
+      <a:solidFill>
+        <a:schemeClr val="phClr"/>
+      </a:solidFill>
+    </cs:spPr>
+  </cs:dataPoint>
+  <cs:dataPoint3D>
+    <cs:lnRef idx="0"/>
+    <cs:fillRef idx="1">
+      <cs:styleClr val="auto"/>
+    </cs:fillRef>
+    <cs:effectRef idx="0"/>
+    <cs:fontRef idx="minor">
+      <a:schemeClr val="tx1"/>
+    </cs:fontRef>
+    <cs:spPr>
+      <a:solidFill>
+        <a:schemeClr val="phClr"/>
+      </a:solidFill>
+    </cs:spPr>
+  </cs:dataPoint3D>
+  <cs:dataPointLine>
+    <cs:lnRef idx="0">
+      <cs:styleClr val="auto"/>
+    </cs:lnRef>
+    <cs:fillRef idx="1"/>
+    <cs:effectRef idx="0"/>
+    <cs:fontRef idx="minor">
+      <a:schemeClr val="tx1"/>
+    </cs:fontRef>
+    <cs:spPr>
+      <a:ln w="28575" cap="rnd">
+        <a:solidFill>
+          <a:schemeClr val="phClr"/>
+        </a:solidFill>
+        <a:round/>
+      </a:ln>
+    </cs:spPr>
+  </cs:dataPointLine>
+  <cs:dataPointMarker>
+    <cs:lnRef idx="0">
+      <cs:styleClr val="auto"/>
+    </cs:lnRef>
+    <cs:fillRef idx="1">
+      <cs:styleClr val="auto"/>
+    </cs:fillRef>
+    <cs:effectRef idx="0"/>
+    <cs:fontRef idx="minor">
+      <a:schemeClr val="tx1"/>
+    </cs:fontRef>
+    <cs:spPr>
+      <a:solidFill>
+        <a:schemeClr val="phClr"/>
+      </a:solidFill>
+      <a:ln w="9525">
+        <a:solidFill>
+          <a:schemeClr val="phClr"/>
+        </a:solidFill>
+      </a:ln>
+    </cs:spPr>
+  </cs:dataPointMarker>
+  <cs:dataPointMarkerLayout symbol="circle" size="5"/>
+  <cs:dataPointWireframe>
+    <cs:lnRef idx="0">
+      <cs:styleClr val="auto"/>
+    </cs:lnRef>
+    <cs:fillRef idx="1"/>
+    <cs:effectRef idx="0"/>
+    <cs:fontRef idx="minor">
+      <a:schemeClr val="tx1"/>
+    </cs:fontRef>
+    <cs:spPr>
+      <a:ln w="9525" cap="rnd">
+        <a:solidFill>
+          <a:schemeClr val="phClr"/>
+        </a:solidFill>
+        <a:round/>
+      </a:ln>
+    </cs:spPr>
+  </cs:dataPointWireframe>
+  <cs:dataTable>
+    <cs:lnRef idx="0"/>
+    <cs:fillRef idx="0"/>
+    <cs:effectRef idx="0"/>
+    <cs:fontRef idx="minor">
+      <a:schemeClr val="tx1">
+        <a:lumMod val="65000"/>
+        <a:lumOff val="35000"/>
+      </a:schemeClr>
+    </cs:fontRef>
+    <cs:spPr>
+      <a:noFill/>
+      <a:ln w="9525" cap="flat" cmpd="sng" algn="ctr">
+        <a:solidFill>
+          <a:schemeClr val="tx1">
+            <a:lumMod val="15000"/>
+            <a:lumOff val="85000"/>
+          </a:schemeClr>
+        </a:solidFill>
+        <a:round/>
+      </a:ln>
+    </cs:spPr>
+    <cs:defRPr sz="900" kern="1200"/>
+  </cs:dataTable>
+  <cs:downBar>
+    <cs:lnRef idx="0"/>
+    <cs:fillRef idx="0"/>
+    <cs:effectRef idx="0"/>
+    <cs:fontRef idx="minor">
+      <a:schemeClr val="dk1"/>
+    </cs:fontRef>
+    <cs:spPr>
+      <a:solidFill>
+        <a:schemeClr val="dk1">
+          <a:lumMod val="65000"/>
+          <a:lumOff val="35000"/>
+        </a:schemeClr>
+      </a:solidFill>
+      <a:ln w="9525">
+        <a:solidFill>
+          <a:schemeClr val="tx1">
+            <a:lumMod val="65000"/>
+            <a:lumOff val="35000"/>
+          </a:schemeClr>
+        </a:solidFill>
+      </a:ln>
+    </cs:spPr>
+  </cs:downBar>
+  <cs:dropLine>
+    <cs:lnRef idx="0"/>
+    <cs:fillRef idx="0"/>
+    <cs:effectRef idx="0"/>
+    <cs:fontRef idx="minor">
+      <a:schemeClr val="tx1"/>
+    </cs:fontRef>
+    <cs:spPr>
+      <a:ln w="9525" cap="flat" cmpd="sng" algn="ctr">
+        <a:solidFill>
+          <a:schemeClr val="tx1">
+            <a:lumMod val="35000"/>
+            <a:lumOff val="65000"/>
+          </a:schemeClr>
+        </a:solidFill>
+        <a:round/>
+      </a:ln>
+    </cs:spPr>
+  </cs:dropLine>
+  <cs:errorBar>
+    <cs:lnRef idx="0"/>
+    <cs:fillRef idx="0"/>
+    <cs:effectRef idx="0"/>
+    <cs:fontRef idx="minor">
+      <a:schemeClr val="tx1"/>
+    </cs:fontRef>
+    <cs:spPr>
+      <a:ln w="9525" cap="flat" cmpd="sng" algn="ctr">
+        <a:solidFill>
+          <a:schemeClr val="tx1">
+            <a:lumMod val="65000"/>
+            <a:lumOff val="35000"/>
+          </a:schemeClr>
+        </a:solidFill>
+        <a:round/>
+      </a:ln>
+    </cs:spPr>
+  </cs:errorBar>
+  <cs:floor>
+    <cs:lnRef idx="0"/>
+    <cs:fillRef idx="0"/>
+    <cs:effectRef idx="0"/>
+    <cs:fontRef idx="minor">
+      <a:schemeClr val="tx1"/>
+    </cs:fontRef>
+    <cs:spPr>
+      <a:noFill/>
+      <a:ln>
+        <a:noFill/>
+      </a:ln>
+    </cs:spPr>
+  </cs:floor>
+  <cs:gridlineMajor>
+    <cs:lnRef idx="0"/>
+    <cs:fillRef idx="0"/>
+    <cs:effectRef idx="0"/>
+    <cs:fontRef idx="minor">
+      <a:schemeClr val="tx1"/>
+    </cs:fontRef>
+    <cs:spPr>
+      <a:ln w="9525" cap="flat" cmpd="sng" algn="ctr">
+        <a:solidFill>
+          <a:schemeClr val="tx1">
+            <a:lumMod val="15000"/>
+            <a:lumOff val="85000"/>
+          </a:schemeClr>
+        </a:solidFill>
+        <a:round/>
+      </a:ln>
+    </cs:spPr>
+  </cs:gridlineMajor>
+  <cs:gridlineMinor>
+    <cs:lnRef idx="0"/>
+    <cs:fillRef idx="0"/>
+    <cs:effectRef idx="0"/>
+    <cs:fontRef idx="minor">
+      <a:schemeClr val="tx1"/>
+    </cs:fontRef>
+    <cs:spPr>
+      <a:ln w="9525" cap="flat" cmpd="sng" algn="ctr">
+        <a:solidFill>
+          <a:schemeClr val="tx1">
+            <a:lumMod val="5000"/>
+            <a:lumOff val="95000"/>
+          </a:schemeClr>
+        </a:solidFill>
+        <a:round/>
+      </a:ln>
+    </cs:spPr>
+  </cs:gridlineMinor>
+  <cs:hiLoLine>
+    <cs:lnRef idx="0"/>
+    <cs:fillRef idx="0"/>
+    <cs:effectRef idx="0"/>
+    <cs:fontRef idx="minor">
+      <a:schemeClr val="tx1"/>
+    </cs:fontRef>
+    <cs:spPr>
+      <a:ln w="9525" cap="flat" cmpd="sng" algn="ctr">
+        <a:solidFill>
+          <a:schemeClr val="tx1">
+            <a:lumMod val="75000"/>
+            <a:lumOff val="25000"/>
+          </a:schemeClr>
+        </a:solidFill>
+        <a:round/>
+      </a:ln>
+    </cs:spPr>
+  </cs:hiLoLine>
+  <cs:leaderLine>
+    <cs:lnRef idx="0"/>
+    <cs:fillRef idx="0"/>
+    <cs:effectRef idx="0"/>
+    <cs:fontRef idx="minor">
+      <a:schemeClr val="tx1"/>
+    </cs:fontRef>
+    <cs:spPr>
+      <a:ln w="9525" cap="flat" cmpd="sng" algn="ctr">
+        <a:solidFill>
+          <a:schemeClr val="tx1">
+            <a:lumMod val="35000"/>
+            <a:lumOff val="65000"/>
+          </a:schemeClr>
+        </a:solidFill>
+        <a:round/>
+      </a:ln>
+    </cs:spPr>
+  </cs:leaderLine>
+  <cs:legend>
+    <cs:lnRef idx="0"/>
+    <cs:fillRef idx="0"/>
+    <cs:effectRef idx="0"/>
+    <cs:fontRef idx="minor">
+      <a:schemeClr val="tx1">
+        <a:lumMod val="65000"/>
+        <a:lumOff val="35000"/>
+      </a:schemeClr>
+    </cs:fontRef>
+    <cs:defRPr sz="900" kern="1200"/>
+  </cs:legend>
+  <cs:plotArea mods="allowNoFillOverride allowNoLineOverride">
+    <cs:lnRef idx="0"/>
+    <cs:fillRef idx="0"/>
+    <cs:effectRef idx="0"/>
+    <cs:fontRef idx="minor">
+      <a:schemeClr val="tx1"/>
+    </cs:fontRef>
+  </cs:plotArea>
+  <cs:plotArea3D mods="allowNoFillOverride allowNoLineOverride">
+    <cs:lnRef idx="0"/>
+    <cs:fillRef idx="0"/>
+    <cs:effectRef idx="0"/>
+    <cs:fontRef idx="minor">
+      <a:schemeClr val="tx1"/>
+    </cs:fontRef>
+  </cs:plotArea3D>
+  <cs:seriesAxis>
+    <cs:lnRef idx="0"/>
+    <cs:fillRef idx="0"/>
+    <cs:effectRef idx="0"/>
+    <cs:fontRef idx="minor">
+      <a:schemeClr val="tx1">
+        <a:lumMod val="65000"/>
+        <a:lumOff val="35000"/>
+      </a:schemeClr>
+    </cs:fontRef>
+    <cs:defRPr sz="900" kern="1200"/>
+  </cs:seriesAxis>
+  <cs:seriesLine>
+    <cs:lnRef idx="0"/>
+    <cs:fillRef idx="0"/>
+    <cs:effectRef idx="0"/>
+    <cs:fontRef idx="minor">
+      <a:schemeClr val="tx1"/>
+    </cs:fontRef>
+    <cs:spPr>
+      <a:ln w="9525" cap="flat" cmpd="sng" algn="ctr">
+        <a:solidFill>
+          <a:schemeClr val="tx1">
+            <a:lumMod val="35000"/>
+            <a:lumOff val="65000"/>
+          </a:schemeClr>
+        </a:solidFill>
+        <a:round/>
+      </a:ln>
+    </cs:spPr>
+  </cs:seriesLine>
+  <cs:title>
+    <cs:lnRef idx="0"/>
+    <cs:fillRef idx="0"/>
+    <cs:effectRef idx="0"/>
+    <cs:fontRef idx="minor">
+      <a:schemeClr val="tx1">
+        <a:lumMod val="65000"/>
+        <a:lumOff val="35000"/>
+      </a:schemeClr>
+    </cs:fontRef>
+    <cs:defRPr sz="1400" b="0" kern="1200" spc="0" baseline="0"/>
+  </cs:title>
+  <cs:trendline>
+    <cs:lnRef idx="0">
+      <cs:styleClr val="auto"/>
+    </cs:lnRef>
+    <cs:fillRef idx="0"/>
+    <cs:effectRef idx="0"/>
+    <cs:fontRef idx="minor">
+      <a:schemeClr val="tx1"/>
+    </cs:fontRef>
+    <cs:spPr>
+      <a:ln w="19050" cap="rnd">
+        <a:solidFill>
+          <a:schemeClr val="phClr"/>
+        </a:solidFill>
+        <a:prstDash val="sysDot"/>
+      </a:ln>
+    </cs:spPr>
+  </cs:trendline>
+  <cs:trendlineLabel>
+    <cs:lnRef idx="0"/>
+    <cs:fillRef idx="0"/>
+    <cs:effectRef idx="0"/>
+    <cs:fontRef idx="minor">
+      <a:schemeClr val="tx1">
+        <a:lumMod val="65000"/>
+        <a:lumOff val="35000"/>
+      </a:schemeClr>
+    </cs:fontRef>
+    <cs:defRPr sz="900" kern="1200"/>
+  </cs:trendlineLabel>
+  <cs:upBar>
+    <cs:lnRef idx="0"/>
+    <cs:fillRef idx="0"/>
+    <cs:effectRef idx="0"/>
+    <cs:fontRef idx="minor">
+      <a:schemeClr val="dk1"/>
+    </cs:fontRef>
+    <cs:spPr>
+      <a:solidFill>
+        <a:schemeClr val="lt1"/>
+      </a:solidFill>
+      <a:ln w="9525">
+        <a:solidFill>
+          <a:schemeClr val="tx1">
+            <a:lumMod val="15000"/>
+            <a:lumOff val="85000"/>
+          </a:schemeClr>
+        </a:solidFill>
+      </a:ln>
+    </cs:spPr>
+  </cs:upBar>
+  <cs:valueAxis>
+    <cs:lnRef idx="0"/>
+    <cs:fillRef idx="0"/>
+    <cs:effectRef idx="0"/>
+    <cs:fontRef idx="minor">
+      <a:schemeClr val="tx1">
+        <a:lumMod val="65000"/>
+        <a:lumOff val="35000"/>
+      </a:schemeClr>
+    </cs:fontRef>
+    <cs:defRPr sz="900" kern="1200"/>
+  </cs:valueAxis>
+  <cs:wall>
+    <cs:lnRef idx="0"/>
+    <cs:fillRef idx="0"/>
+    <cs:effectRef idx="0"/>
+    <cs:fontRef idx="minor">
+      <a:schemeClr val="tx1"/>
+    </cs:fontRef>
+    <cs:spPr>
+      <a:noFill/>
+      <a:ln>
+        <a:noFill/>
+      </a:ln>
+    </cs:spPr>
+  </cs:wall>
+</cs:chartStyle>
+</file>
+
 <file path=ppt/slideLayouts/slideLayout1.xml><?xml version="1.0" encoding="utf-8"?>
 <p:sldLayout xmlns:a="http://schemas.openxmlformats.org/drawingml/2006/main" xmlns:r="http://schemas.openxmlformats.org/officeDocument/2006/relationships" xmlns:p="http://schemas.openxmlformats.org/presentationml/2006/main" type="title" preserve="1">
   <p:cSld name="Title Slide">
@@ -263,7 +1557,7 @@
           <a:p>
             <a:fld id="{C1A42282-78D6-4E28-8BE6-4CDBCF8F799E}" type="datetimeFigureOut">
               <a:rPr lang="en-US" smtClean="0"/>
-              <a:t>10/9/2018</a:t>
+              <a:t>10/21/2018</a:t>
             </a:fld>
             <a:endParaRPr lang="en-US"/>
           </a:p>
@@ -461,7 +1755,7 @@
           <a:p>
             <a:fld id="{C1A42282-78D6-4E28-8BE6-4CDBCF8F799E}" type="datetimeFigureOut">
               <a:rPr lang="en-US" smtClean="0"/>
-              <a:t>10/9/2018</a:t>
+              <a:t>10/21/2018</a:t>
             </a:fld>
             <a:endParaRPr lang="en-US"/>
           </a:p>
@@ -669,7 +1963,7 @@
           <a:p>
             <a:fld id="{C1A42282-78D6-4E28-8BE6-4CDBCF8F799E}" type="datetimeFigureOut">
               <a:rPr lang="en-US" smtClean="0"/>
-              <a:t>10/9/2018</a:t>
+              <a:t>10/21/2018</a:t>
             </a:fld>
             <a:endParaRPr lang="en-US"/>
           </a:p>
@@ -867,7 +2161,7 @@
           <a:p>
             <a:fld id="{C1A42282-78D6-4E28-8BE6-4CDBCF8F799E}" type="datetimeFigureOut">
               <a:rPr lang="en-US" smtClean="0"/>
-              <a:t>10/9/2018</a:t>
+              <a:t>10/21/2018</a:t>
             </a:fld>
             <a:endParaRPr lang="en-US"/>
           </a:p>
@@ -1142,7 +2436,7 @@
           <a:p>
             <a:fld id="{C1A42282-78D6-4E28-8BE6-4CDBCF8F799E}" type="datetimeFigureOut">
               <a:rPr lang="en-US" smtClean="0"/>
-              <a:t>10/9/2018</a:t>
+              <a:t>10/21/2018</a:t>
             </a:fld>
             <a:endParaRPr lang="en-US"/>
           </a:p>
@@ -1407,7 +2701,7 @@
           <a:p>
             <a:fld id="{C1A42282-78D6-4E28-8BE6-4CDBCF8F799E}" type="datetimeFigureOut">
               <a:rPr lang="en-US" smtClean="0"/>
-              <a:t>10/9/2018</a:t>
+              <a:t>10/21/2018</a:t>
             </a:fld>
             <a:endParaRPr lang="en-US"/>
           </a:p>
@@ -1819,7 +3113,7 @@
           <a:p>
             <a:fld id="{C1A42282-78D6-4E28-8BE6-4CDBCF8F799E}" type="datetimeFigureOut">
               <a:rPr lang="en-US" smtClean="0"/>
-              <a:t>10/9/2018</a:t>
+              <a:t>10/21/2018</a:t>
             </a:fld>
             <a:endParaRPr lang="en-US"/>
           </a:p>
@@ -1960,7 +3254,7 @@
           <a:p>
             <a:fld id="{C1A42282-78D6-4E28-8BE6-4CDBCF8F799E}" type="datetimeFigureOut">
               <a:rPr lang="en-US" smtClean="0"/>
-              <a:t>10/9/2018</a:t>
+              <a:t>10/21/2018</a:t>
             </a:fld>
             <a:endParaRPr lang="en-US"/>
           </a:p>
@@ -2073,7 +3367,7 @@
           <a:p>
             <a:fld id="{C1A42282-78D6-4E28-8BE6-4CDBCF8F799E}" type="datetimeFigureOut">
               <a:rPr lang="en-US" smtClean="0"/>
-              <a:t>10/9/2018</a:t>
+              <a:t>10/21/2018</a:t>
             </a:fld>
             <a:endParaRPr lang="en-US"/>
           </a:p>
@@ -2384,7 +3678,7 @@
           <a:p>
             <a:fld id="{C1A42282-78D6-4E28-8BE6-4CDBCF8F799E}" type="datetimeFigureOut">
               <a:rPr lang="en-US" smtClean="0"/>
-              <a:t>10/9/2018</a:t>
+              <a:t>10/21/2018</a:t>
             </a:fld>
             <a:endParaRPr lang="en-US"/>
           </a:p>
@@ -2672,7 +3966,7 @@
           <a:p>
             <a:fld id="{C1A42282-78D6-4E28-8BE6-4CDBCF8F799E}" type="datetimeFigureOut">
               <a:rPr lang="en-US" smtClean="0"/>
-              <a:t>10/9/2018</a:t>
+              <a:t>10/21/2018</a:t>
             </a:fld>
             <a:endParaRPr lang="en-US"/>
           </a:p>
@@ -2913,7 +4207,7 @@
           <a:p>
             <a:fld id="{C1A42282-78D6-4E28-8BE6-4CDBCF8F799E}" type="datetimeFigureOut">
               <a:rPr lang="en-US" smtClean="0"/>
-              <a:t>10/9/2018</a:t>
+              <a:t>10/21/2018</a:t>
             </a:fld>
             <a:endParaRPr lang="en-US"/>
           </a:p>
@@ -3678,6 +4972,1136 @@
 </p:sld>
 </file>
 
+<file path=ppt/slides/slide10.xml><?xml version="1.0" encoding="utf-8"?>
+<p:sld xmlns:a="http://schemas.openxmlformats.org/drawingml/2006/main" xmlns:r="http://schemas.openxmlformats.org/officeDocument/2006/relationships" xmlns:p="http://schemas.openxmlformats.org/presentationml/2006/main">
+  <p:cSld>
+    <p:bg>
+      <p:bgPr>
+        <a:solidFill>
+          <a:schemeClr val="bg1"/>
+        </a:solidFill>
+        <a:effectLst/>
+      </p:bgPr>
+    </p:bg>
+    <p:spTree>
+      <p:nvGrpSpPr>
+        <p:cNvPr id="1" name=""/>
+        <p:cNvGrpSpPr/>
+        <p:nvPr/>
+      </p:nvGrpSpPr>
+      <p:grpSpPr>
+        <a:xfrm>
+          <a:off x="0" y="0"/>
+          <a:ext cx="0" cy="0"/>
+          <a:chOff x="0" y="0"/>
+          <a:chExt cx="0" cy="0"/>
+        </a:xfrm>
+      </p:grpSpPr>
+      <p:sp>
+        <p:nvSpPr>
+          <p:cNvPr id="9" name="Rectangle 8">
+            <a:extLst>
+              <a:ext uri="{FF2B5EF4-FFF2-40B4-BE49-F238E27FC236}">
+                <a16:creationId xmlns:a16="http://schemas.microsoft.com/office/drawing/2014/main" id="{6753252F-4873-4F63-801D-CC719279A7D5}"/>
+              </a:ext>
+              <a:ext uri="{C183D7F6-B498-43B3-948B-1728B52AA6E4}">
+                <adec:decorative xmlns:adec="http://schemas.microsoft.com/office/drawing/2017/decorative" val="1"/>
+              </a:ext>
+            </a:extLst>
+          </p:cNvPr>
+          <p:cNvSpPr>
+            <a:spLocks noGrp="1" noRot="1" noChangeAspect="1" noMove="1" noResize="1" noEditPoints="1" noAdjustHandles="1" noChangeArrowheads="1" noChangeShapeType="1" noTextEdit="1"/>
+          </p:cNvSpPr>
+          <p:nvPr>
+            <p:extLst>
+              <p:ext uri="{386F3935-93C4-4BCD-93E2-E3B085C9AB24}">
+                <p16:designElem xmlns:p16="http://schemas.microsoft.com/office/powerpoint/2015/main" val="1"/>
+              </p:ext>
+            </p:extLst>
+          </p:nvPr>
+        </p:nvSpPr>
+        <p:spPr>
+          <a:xfrm>
+            <a:off x="0" y="0"/>
+            <a:ext cx="12192000" cy="6858000"/>
+          </a:xfrm>
+          <a:prstGeom prst="rect">
+            <a:avLst/>
+          </a:prstGeom>
+          <a:solidFill>
+            <a:srgbClr val="FFFFFF"/>
+          </a:solidFill>
+          <a:ln>
+            <a:noFill/>
+          </a:ln>
+        </p:spPr>
+        <p:style>
+          <a:lnRef idx="2">
+            <a:schemeClr val="accent1">
+              <a:shade val="50000"/>
+            </a:schemeClr>
+          </a:lnRef>
+          <a:fillRef idx="1">
+            <a:schemeClr val="accent1"/>
+          </a:fillRef>
+          <a:effectRef idx="0">
+            <a:schemeClr val="accent1"/>
+          </a:effectRef>
+          <a:fontRef idx="minor">
+            <a:schemeClr val="lt1"/>
+          </a:fontRef>
+        </p:style>
+        <p:txBody>
+          <a:bodyPr rtlCol="0" anchor="ctr"/>
+          <a:lstStyle/>
+          <a:p>
+            <a:pPr algn="ctr"/>
+            <a:endParaRPr lang="en-US"/>
+          </a:p>
+        </p:txBody>
+      </p:sp>
+      <p:sp>
+        <p:nvSpPr>
+          <p:cNvPr id="11" name="Rectangle 10">
+            <a:extLst>
+              <a:ext uri="{FF2B5EF4-FFF2-40B4-BE49-F238E27FC236}">
+                <a16:creationId xmlns:a16="http://schemas.microsoft.com/office/drawing/2014/main" id="{047C8CCB-F95D-4249-92DD-651249D3535A}"/>
+              </a:ext>
+              <a:ext uri="{C183D7F6-B498-43B3-948B-1728B52AA6E4}">
+                <adec:decorative xmlns:adec="http://schemas.microsoft.com/office/drawing/2017/decorative" val="1"/>
+              </a:ext>
+            </a:extLst>
+          </p:cNvPr>
+          <p:cNvSpPr>
+            <a:spLocks noGrp="1" noRot="1" noChangeAspect="1" noMove="1" noResize="1" noEditPoints="1" noAdjustHandles="1" noChangeArrowheads="1" noChangeShapeType="1" noTextEdit="1"/>
+          </p:cNvSpPr>
+          <p:nvPr>
+            <p:extLst>
+              <p:ext uri="{386F3935-93C4-4BCD-93E2-E3B085C9AB24}">
+                <p16:designElem xmlns:p16="http://schemas.microsoft.com/office/powerpoint/2015/main" val="1"/>
+              </p:ext>
+            </p:extLst>
+          </p:nvPr>
+        </p:nvSpPr>
+        <p:spPr>
+          <a:xfrm>
+            <a:off x="0" y="0"/>
+            <a:ext cx="2013557" cy="6858000"/>
+          </a:xfrm>
+          <a:prstGeom prst="rect">
+            <a:avLst/>
+          </a:prstGeom>
+          <a:solidFill>
+            <a:srgbClr val="7F7F7F"/>
+          </a:solidFill>
+          <a:ln>
+            <a:noFill/>
+          </a:ln>
+        </p:spPr>
+        <p:style>
+          <a:lnRef idx="2">
+            <a:schemeClr val="accent1">
+              <a:shade val="50000"/>
+            </a:schemeClr>
+          </a:lnRef>
+          <a:fillRef idx="1">
+            <a:schemeClr val="accent1"/>
+          </a:fillRef>
+          <a:effectRef idx="0">
+            <a:schemeClr val="accent1"/>
+          </a:effectRef>
+          <a:fontRef idx="minor">
+            <a:schemeClr val="lt1"/>
+          </a:fontRef>
+        </p:style>
+        <p:txBody>
+          <a:bodyPr rtlCol="0" anchor="ctr"/>
+          <a:lstStyle/>
+          <a:p>
+            <a:pPr algn="ctr"/>
+            <a:endParaRPr lang="en-US"/>
+          </a:p>
+        </p:txBody>
+      </p:sp>
+      <p:sp>
+        <p:nvSpPr>
+          <p:cNvPr id="2" name="Title 1">
+            <a:extLst>
+              <a:ext uri="{FF2B5EF4-FFF2-40B4-BE49-F238E27FC236}">
+                <a16:creationId xmlns:a16="http://schemas.microsoft.com/office/drawing/2014/main" id="{3AE3BD26-299A-453A-B0EE-B309650744E3}"/>
+              </a:ext>
+            </a:extLst>
+          </p:cNvPr>
+          <p:cNvSpPr>
+            <a:spLocks noGrp="1"/>
+          </p:cNvSpPr>
+          <p:nvPr>
+            <p:ph type="title"/>
+          </p:nvPr>
+        </p:nvSpPr>
+        <p:spPr>
+          <a:xfrm>
+            <a:off x="640080" y="2074363"/>
+            <a:ext cx="2752354" cy="2709275"/>
+          </a:xfrm>
+          <a:prstGeom prst="ellipse">
+            <a:avLst/>
+          </a:prstGeom>
+          <a:solidFill>
+            <a:srgbClr val="262626"/>
+          </a:solidFill>
+          <a:ln w="174625" cmpd="thinThick">
+            <a:solidFill>
+              <a:srgbClr val="262626"/>
+            </a:solidFill>
+          </a:ln>
+        </p:spPr>
+        <p:txBody>
+          <a:bodyPr vert="horz" lIns="91440" tIns="45720" rIns="91440" bIns="45720" rtlCol="0" anchor="ctr">
+            <a:normAutofit/>
+          </a:bodyPr>
+          <a:lstStyle/>
+          <a:p>
+            <a:pPr algn="ctr"/>
+            <a:r>
+              <a:rPr lang="en-US" sz="2600" kern="1200">
+                <a:solidFill>
+                  <a:srgbClr val="FFFFFF"/>
+                </a:solidFill>
+                <a:latin typeface="+mj-lt"/>
+                <a:ea typeface="+mj-ea"/>
+                <a:cs typeface="+mj-cs"/>
+              </a:rPr>
+              <a:t>Drifting Problem</a:t>
+            </a:r>
+          </a:p>
+        </p:txBody>
+      </p:sp>
+      <p:pic>
+        <p:nvPicPr>
+          <p:cNvPr id="4" name="Picture 3">
+            <a:extLst>
+              <a:ext uri="{FF2B5EF4-FFF2-40B4-BE49-F238E27FC236}">
+                <a16:creationId xmlns:a16="http://schemas.microsoft.com/office/drawing/2014/main" id="{382757FB-038B-4213-8C25-9160CABFA75B}"/>
+              </a:ext>
+            </a:extLst>
+          </p:cNvPr>
+          <p:cNvPicPr/>
+          <p:nvPr/>
+        </p:nvPicPr>
+        <p:blipFill>
+          <a:blip r:embed="rId2"/>
+          <a:stretch>
+            <a:fillRect/>
+          </a:stretch>
+        </p:blipFill>
+        <p:spPr>
+          <a:xfrm>
+            <a:off x="4038600" y="1396640"/>
+            <a:ext cx="7188199" cy="4061331"/>
+          </a:xfrm>
+          <a:prstGeom prst="rect">
+            <a:avLst/>
+          </a:prstGeom>
+        </p:spPr>
+      </p:pic>
+    </p:spTree>
+    <p:extLst>
+      <p:ext uri="{BB962C8B-B14F-4D97-AF65-F5344CB8AC3E}">
+        <p14:creationId xmlns:p14="http://schemas.microsoft.com/office/powerpoint/2010/main" val="3074020901"/>
+      </p:ext>
+    </p:extLst>
+  </p:cSld>
+  <p:clrMapOvr>
+    <a:masterClrMapping/>
+  </p:clrMapOvr>
+</p:sld>
+</file>
+
+<file path=ppt/slides/slide11.xml><?xml version="1.0" encoding="utf-8"?>
+<p:sld xmlns:a="http://schemas.openxmlformats.org/drawingml/2006/main" xmlns:r="http://schemas.openxmlformats.org/officeDocument/2006/relationships" xmlns:p="http://schemas.openxmlformats.org/presentationml/2006/main">
+  <p:cSld>
+    <p:spTree>
+      <p:nvGrpSpPr>
+        <p:cNvPr id="1" name=""/>
+        <p:cNvGrpSpPr/>
+        <p:nvPr/>
+      </p:nvGrpSpPr>
+      <p:grpSpPr>
+        <a:xfrm>
+          <a:off x="0" y="0"/>
+          <a:ext cx="0" cy="0"/>
+          <a:chOff x="0" y="0"/>
+          <a:chExt cx="0" cy="0"/>
+        </a:xfrm>
+      </p:grpSpPr>
+      <p:sp>
+        <p:nvSpPr>
+          <p:cNvPr id="2" name="Title 1">
+            <a:extLst>
+              <a:ext uri="{FF2B5EF4-FFF2-40B4-BE49-F238E27FC236}">
+                <a16:creationId xmlns:a16="http://schemas.microsoft.com/office/drawing/2014/main" id="{3760F8A1-A61F-4031-A50C-09202ABEA9DB}"/>
+              </a:ext>
+            </a:extLst>
+          </p:cNvPr>
+          <p:cNvSpPr>
+            <a:spLocks noGrp="1"/>
+          </p:cNvSpPr>
+          <p:nvPr>
+            <p:ph type="title"/>
+          </p:nvPr>
+        </p:nvSpPr>
+        <p:spPr>
+          <a:xfrm>
+            <a:off x="640080" y="2074363"/>
+            <a:ext cx="2752354" cy="2709275"/>
+          </a:xfrm>
+          <a:prstGeom prst="ellipse">
+            <a:avLst/>
+          </a:prstGeom>
+          <a:solidFill>
+            <a:srgbClr val="262626"/>
+          </a:solidFill>
+          <a:ln w="174625" cmpd="thinThick">
+            <a:solidFill>
+              <a:srgbClr val="262626"/>
+            </a:solidFill>
+          </a:ln>
+        </p:spPr>
+        <p:txBody>
+          <a:bodyPr vert="horz" lIns="91440" tIns="45720" rIns="91440" bIns="45720" rtlCol="0" anchor="ctr">
+            <a:normAutofit/>
+          </a:bodyPr>
+          <a:lstStyle/>
+          <a:p>
+            <a:pPr algn="ctr"/>
+            <a:r>
+              <a:rPr lang="en-US" sz="2800" dirty="0">
+                <a:solidFill>
+                  <a:schemeClr val="bg1"/>
+                </a:solidFill>
+              </a:rPr>
+              <a:t>State Time-slot Weight (User 1 (200811))</a:t>
+            </a:r>
+            <a:endParaRPr lang="en-US" sz="2600" kern="1200" dirty="0">
+              <a:solidFill>
+                <a:schemeClr val="bg1"/>
+              </a:solidFill>
+            </a:endParaRPr>
+          </a:p>
+        </p:txBody>
+      </p:sp>
+      <p:pic>
+        <p:nvPicPr>
+          <p:cNvPr id="4" name="Picture 3">
+            <a:extLst>
+              <a:ext uri="{FF2B5EF4-FFF2-40B4-BE49-F238E27FC236}">
+                <a16:creationId xmlns:a16="http://schemas.microsoft.com/office/drawing/2014/main" id="{595BC3A4-4B3C-40DE-9802-84E5D5E8F2BB}"/>
+              </a:ext>
+            </a:extLst>
+          </p:cNvPr>
+          <p:cNvPicPr>
+            <a:picLocks noChangeAspect="1"/>
+          </p:cNvPicPr>
+          <p:nvPr/>
+        </p:nvPicPr>
+        <p:blipFill>
+          <a:blip r:embed="rId2">
+            <a:extLst>
+              <a:ext uri="{28A0092B-C50C-407E-A947-70E740481C1C}">
+                <a14:useLocalDpi xmlns:a14="http://schemas.microsoft.com/office/drawing/2010/main" val="0"/>
+              </a:ext>
+            </a:extLst>
+          </a:blip>
+          <a:stretch>
+            <a:fillRect/>
+          </a:stretch>
+        </p:blipFill>
+        <p:spPr>
+          <a:xfrm>
+            <a:off x="3514570" y="0"/>
+            <a:ext cx="8677429" cy="6858000"/>
+          </a:xfrm>
+          <a:prstGeom prst="rect">
+            <a:avLst/>
+          </a:prstGeom>
+        </p:spPr>
+      </p:pic>
+      <p:sp>
+        <p:nvSpPr>
+          <p:cNvPr id="5" name="Left Bracket 4">
+            <a:extLst>
+              <a:ext uri="{FF2B5EF4-FFF2-40B4-BE49-F238E27FC236}">
+                <a16:creationId xmlns:a16="http://schemas.microsoft.com/office/drawing/2014/main" id="{5E3668B9-351B-4BC9-9D51-EA601BE55428}"/>
+              </a:ext>
+            </a:extLst>
+          </p:cNvPr>
+          <p:cNvSpPr/>
+          <p:nvPr/>
+        </p:nvSpPr>
+        <p:spPr>
+          <a:xfrm>
+            <a:off x="3883974" y="5122427"/>
+            <a:ext cx="372862" cy="479394"/>
+          </a:xfrm>
+          <a:prstGeom prst="leftBracket">
+            <a:avLst/>
+          </a:prstGeom>
+          <a:ln>
+            <a:solidFill>
+              <a:schemeClr val="bg2">
+                <a:lumMod val="90000"/>
+              </a:schemeClr>
+            </a:solidFill>
+          </a:ln>
+        </p:spPr>
+        <p:style>
+          <a:lnRef idx="1">
+            <a:schemeClr val="accent1"/>
+          </a:lnRef>
+          <a:fillRef idx="0">
+            <a:schemeClr val="accent1"/>
+          </a:fillRef>
+          <a:effectRef idx="0">
+            <a:schemeClr val="accent1"/>
+          </a:effectRef>
+          <a:fontRef idx="minor">
+            <a:schemeClr val="tx1"/>
+          </a:fontRef>
+        </p:style>
+        <p:txBody>
+          <a:bodyPr rtlCol="0" anchor="ctr"/>
+          <a:lstStyle/>
+          <a:p>
+            <a:pPr algn="ctr"/>
+            <a:endParaRPr lang="de-DE"/>
+          </a:p>
+        </p:txBody>
+      </p:sp>
+      <p:sp>
+        <p:nvSpPr>
+          <p:cNvPr id="10" name="Left Bracket 9">
+            <a:extLst>
+              <a:ext uri="{FF2B5EF4-FFF2-40B4-BE49-F238E27FC236}">
+                <a16:creationId xmlns:a16="http://schemas.microsoft.com/office/drawing/2014/main" id="{7A64BD25-0E76-4BDD-A014-7AC8BE3D9766}"/>
+              </a:ext>
+            </a:extLst>
+          </p:cNvPr>
+          <p:cNvSpPr/>
+          <p:nvPr/>
+        </p:nvSpPr>
+        <p:spPr>
+          <a:xfrm>
+            <a:off x="3883974" y="3561426"/>
+            <a:ext cx="372862" cy="479394"/>
+          </a:xfrm>
+          <a:prstGeom prst="leftBracket">
+            <a:avLst/>
+          </a:prstGeom>
+          <a:ln>
+            <a:solidFill>
+              <a:schemeClr val="bg2">
+                <a:lumMod val="90000"/>
+              </a:schemeClr>
+            </a:solidFill>
+          </a:ln>
+        </p:spPr>
+        <p:style>
+          <a:lnRef idx="1">
+            <a:schemeClr val="accent1"/>
+          </a:lnRef>
+          <a:fillRef idx="0">
+            <a:schemeClr val="accent1"/>
+          </a:fillRef>
+          <a:effectRef idx="0">
+            <a:schemeClr val="accent1"/>
+          </a:effectRef>
+          <a:fontRef idx="minor">
+            <a:schemeClr val="tx1"/>
+          </a:fontRef>
+        </p:style>
+        <p:txBody>
+          <a:bodyPr rtlCol="0" anchor="ctr"/>
+          <a:lstStyle/>
+          <a:p>
+            <a:pPr algn="ctr"/>
+            <a:endParaRPr lang="de-DE"/>
+          </a:p>
+        </p:txBody>
+      </p:sp>
+      <p:sp>
+        <p:nvSpPr>
+          <p:cNvPr id="11" name="Left Bracket 10">
+            <a:extLst>
+              <a:ext uri="{FF2B5EF4-FFF2-40B4-BE49-F238E27FC236}">
+                <a16:creationId xmlns:a16="http://schemas.microsoft.com/office/drawing/2014/main" id="{8325BEBC-D35D-436F-91B2-C83607D98336}"/>
+              </a:ext>
+            </a:extLst>
+          </p:cNvPr>
+          <p:cNvSpPr/>
+          <p:nvPr/>
+        </p:nvSpPr>
+        <p:spPr>
+          <a:xfrm>
+            <a:off x="3918005" y="2018181"/>
+            <a:ext cx="372862" cy="479394"/>
+          </a:xfrm>
+          <a:prstGeom prst="leftBracket">
+            <a:avLst/>
+          </a:prstGeom>
+          <a:ln>
+            <a:solidFill>
+              <a:schemeClr val="bg2">
+                <a:lumMod val="90000"/>
+              </a:schemeClr>
+            </a:solidFill>
+          </a:ln>
+        </p:spPr>
+        <p:style>
+          <a:lnRef idx="1">
+            <a:schemeClr val="accent1"/>
+          </a:lnRef>
+          <a:fillRef idx="0">
+            <a:schemeClr val="accent1"/>
+          </a:fillRef>
+          <a:effectRef idx="0">
+            <a:schemeClr val="accent1"/>
+          </a:effectRef>
+          <a:fontRef idx="minor">
+            <a:schemeClr val="tx1"/>
+          </a:fontRef>
+        </p:style>
+        <p:txBody>
+          <a:bodyPr rtlCol="0" anchor="ctr"/>
+          <a:lstStyle/>
+          <a:p>
+            <a:pPr algn="ctr"/>
+            <a:endParaRPr lang="de-DE"/>
+          </a:p>
+        </p:txBody>
+      </p:sp>
+      <p:sp>
+        <p:nvSpPr>
+          <p:cNvPr id="12" name="Left Bracket 11">
+            <a:extLst>
+              <a:ext uri="{FF2B5EF4-FFF2-40B4-BE49-F238E27FC236}">
+                <a16:creationId xmlns:a16="http://schemas.microsoft.com/office/drawing/2014/main" id="{D13BE39F-7525-468C-940F-6542E8B17B04}"/>
+              </a:ext>
+            </a:extLst>
+          </p:cNvPr>
+          <p:cNvSpPr/>
+          <p:nvPr/>
+        </p:nvSpPr>
+        <p:spPr>
+          <a:xfrm>
+            <a:off x="4070405" y="510455"/>
+            <a:ext cx="372862" cy="479394"/>
+          </a:xfrm>
+          <a:prstGeom prst="leftBracket">
+            <a:avLst/>
+          </a:prstGeom>
+          <a:ln>
+            <a:solidFill>
+              <a:schemeClr val="bg2">
+                <a:lumMod val="90000"/>
+              </a:schemeClr>
+            </a:solidFill>
+          </a:ln>
+        </p:spPr>
+        <p:style>
+          <a:lnRef idx="1">
+            <a:schemeClr val="accent1"/>
+          </a:lnRef>
+          <a:fillRef idx="0">
+            <a:schemeClr val="accent1"/>
+          </a:fillRef>
+          <a:effectRef idx="0">
+            <a:schemeClr val="accent1"/>
+          </a:effectRef>
+          <a:fontRef idx="minor">
+            <a:schemeClr val="tx1"/>
+          </a:fontRef>
+        </p:style>
+        <p:txBody>
+          <a:bodyPr rtlCol="0" anchor="ctr"/>
+          <a:lstStyle/>
+          <a:p>
+            <a:pPr algn="ctr"/>
+            <a:endParaRPr lang="de-DE"/>
+          </a:p>
+        </p:txBody>
+      </p:sp>
+      <p:sp>
+        <p:nvSpPr>
+          <p:cNvPr id="6" name="TextBox 5">
+            <a:extLst>
+              <a:ext uri="{FF2B5EF4-FFF2-40B4-BE49-F238E27FC236}">
+                <a16:creationId xmlns:a16="http://schemas.microsoft.com/office/drawing/2014/main" id="{B3002C79-1379-41EE-9675-3B96B63FA587}"/>
+              </a:ext>
+            </a:extLst>
+          </p:cNvPr>
+          <p:cNvSpPr txBox="1"/>
+          <p:nvPr/>
+        </p:nvSpPr>
+        <p:spPr>
+          <a:xfrm>
+            <a:off x="4102962" y="576120"/>
+            <a:ext cx="1172116" cy="369332"/>
+          </a:xfrm>
+          <a:prstGeom prst="rect">
+            <a:avLst/>
+          </a:prstGeom>
+          <a:noFill/>
+        </p:spPr>
+        <p:txBody>
+          <a:bodyPr wrap="none" rtlCol="0">
+            <a:spAutoFit/>
+          </a:bodyPr>
+          <a:lstStyle/>
+          <a:p>
+            <a:r>
+              <a:rPr lang="de-DE" dirty="0">
+                <a:latin typeface="CMU Bright" panose="02000603000000000000" pitchFamily="2" charset="0"/>
+                <a:ea typeface="CMU Bright" panose="02000603000000000000" pitchFamily="2" charset="0"/>
+                <a:cs typeface="CMU Bright" panose="02000603000000000000" pitchFamily="2" charset="0"/>
+              </a:rPr>
+              <a:t>Weekends</a:t>
+            </a:r>
+          </a:p>
+        </p:txBody>
+      </p:sp>
+    </p:spTree>
+    <p:extLst>
+      <p:ext uri="{BB962C8B-B14F-4D97-AF65-F5344CB8AC3E}">
+        <p14:creationId xmlns:p14="http://schemas.microsoft.com/office/powerpoint/2010/main" val="926498886"/>
+      </p:ext>
+    </p:extLst>
+  </p:cSld>
+  <p:clrMapOvr>
+    <a:masterClrMapping/>
+  </p:clrMapOvr>
+</p:sld>
+</file>
+
+<file path=ppt/slides/slide12.xml><?xml version="1.0" encoding="utf-8"?>
+<p:sld xmlns:a="http://schemas.openxmlformats.org/drawingml/2006/main" xmlns:r="http://schemas.openxmlformats.org/officeDocument/2006/relationships" xmlns:p="http://schemas.openxmlformats.org/presentationml/2006/main">
+  <p:cSld>
+    <p:bg>
+      <p:bgPr>
+        <a:solidFill>
+          <a:schemeClr val="bg1"/>
+        </a:solidFill>
+        <a:effectLst/>
+      </p:bgPr>
+    </p:bg>
+    <p:spTree>
+      <p:nvGrpSpPr>
+        <p:cNvPr id="1" name=""/>
+        <p:cNvGrpSpPr/>
+        <p:nvPr/>
+      </p:nvGrpSpPr>
+      <p:grpSpPr>
+        <a:xfrm>
+          <a:off x="0" y="0"/>
+          <a:ext cx="0" cy="0"/>
+          <a:chOff x="0" y="0"/>
+          <a:chExt cx="0" cy="0"/>
+        </a:xfrm>
+      </p:grpSpPr>
+      <p:sp>
+        <p:nvSpPr>
+          <p:cNvPr id="9" name="Rectangle 8">
+            <a:extLst>
+              <a:ext uri="{FF2B5EF4-FFF2-40B4-BE49-F238E27FC236}">
+                <a16:creationId xmlns:a16="http://schemas.microsoft.com/office/drawing/2014/main" id="{6753252F-4873-4F63-801D-CC719279A7D5}"/>
+              </a:ext>
+              <a:ext uri="{C183D7F6-B498-43B3-948B-1728B52AA6E4}">
+                <adec:decorative xmlns:adec="http://schemas.microsoft.com/office/drawing/2017/decorative" val="1"/>
+              </a:ext>
+            </a:extLst>
+          </p:cNvPr>
+          <p:cNvSpPr>
+            <a:spLocks noGrp="1" noRot="1" noChangeAspect="1" noMove="1" noResize="1" noEditPoints="1" noAdjustHandles="1" noChangeArrowheads="1" noChangeShapeType="1" noTextEdit="1"/>
+          </p:cNvSpPr>
+          <p:nvPr>
+            <p:extLst>
+              <p:ext uri="{386F3935-93C4-4BCD-93E2-E3B085C9AB24}">
+                <p16:designElem xmlns:p16="http://schemas.microsoft.com/office/powerpoint/2015/main" val="1"/>
+              </p:ext>
+            </p:extLst>
+          </p:nvPr>
+        </p:nvSpPr>
+        <p:spPr>
+          <a:xfrm>
+            <a:off x="0" y="0"/>
+            <a:ext cx="12192000" cy="6858000"/>
+          </a:xfrm>
+          <a:prstGeom prst="rect">
+            <a:avLst/>
+          </a:prstGeom>
+          <a:solidFill>
+            <a:srgbClr val="FFFFFF"/>
+          </a:solidFill>
+          <a:ln>
+            <a:noFill/>
+          </a:ln>
+        </p:spPr>
+        <p:style>
+          <a:lnRef idx="2">
+            <a:schemeClr val="accent1">
+              <a:shade val="50000"/>
+            </a:schemeClr>
+          </a:lnRef>
+          <a:fillRef idx="1">
+            <a:schemeClr val="accent1"/>
+          </a:fillRef>
+          <a:effectRef idx="0">
+            <a:schemeClr val="accent1"/>
+          </a:effectRef>
+          <a:fontRef idx="minor">
+            <a:schemeClr val="lt1"/>
+          </a:fontRef>
+        </p:style>
+        <p:txBody>
+          <a:bodyPr rtlCol="0" anchor="ctr"/>
+          <a:lstStyle/>
+          <a:p>
+            <a:pPr algn="ctr"/>
+            <a:endParaRPr lang="en-US"/>
+          </a:p>
+        </p:txBody>
+      </p:sp>
+      <p:sp>
+        <p:nvSpPr>
+          <p:cNvPr id="11" name="Rectangle 10">
+            <a:extLst>
+              <a:ext uri="{FF2B5EF4-FFF2-40B4-BE49-F238E27FC236}">
+                <a16:creationId xmlns:a16="http://schemas.microsoft.com/office/drawing/2014/main" id="{047C8CCB-F95D-4249-92DD-651249D3535A}"/>
+              </a:ext>
+              <a:ext uri="{C183D7F6-B498-43B3-948B-1728B52AA6E4}">
+                <adec:decorative xmlns:adec="http://schemas.microsoft.com/office/drawing/2017/decorative" val="1"/>
+              </a:ext>
+            </a:extLst>
+          </p:cNvPr>
+          <p:cNvSpPr>
+            <a:spLocks noGrp="1" noRot="1" noChangeAspect="1" noMove="1" noResize="1" noEditPoints="1" noAdjustHandles="1" noChangeArrowheads="1" noChangeShapeType="1" noTextEdit="1"/>
+          </p:cNvSpPr>
+          <p:nvPr>
+            <p:extLst>
+              <p:ext uri="{386F3935-93C4-4BCD-93E2-E3B085C9AB24}">
+                <p16:designElem xmlns:p16="http://schemas.microsoft.com/office/powerpoint/2015/main" val="1"/>
+              </p:ext>
+            </p:extLst>
+          </p:nvPr>
+        </p:nvSpPr>
+        <p:spPr>
+          <a:xfrm>
+            <a:off x="0" y="0"/>
+            <a:ext cx="2013557" cy="6858000"/>
+          </a:xfrm>
+          <a:prstGeom prst="rect">
+            <a:avLst/>
+          </a:prstGeom>
+          <a:solidFill>
+            <a:srgbClr val="7F7F7F"/>
+          </a:solidFill>
+          <a:ln>
+            <a:noFill/>
+          </a:ln>
+        </p:spPr>
+        <p:style>
+          <a:lnRef idx="2">
+            <a:schemeClr val="accent1">
+              <a:shade val="50000"/>
+            </a:schemeClr>
+          </a:lnRef>
+          <a:fillRef idx="1">
+            <a:schemeClr val="accent1"/>
+          </a:fillRef>
+          <a:effectRef idx="0">
+            <a:schemeClr val="accent1"/>
+          </a:effectRef>
+          <a:fontRef idx="minor">
+            <a:schemeClr val="lt1"/>
+          </a:fontRef>
+        </p:style>
+        <p:txBody>
+          <a:bodyPr rtlCol="0" anchor="ctr"/>
+          <a:lstStyle/>
+          <a:p>
+            <a:pPr algn="ctr"/>
+            <a:endParaRPr lang="en-US"/>
+          </a:p>
+        </p:txBody>
+      </p:sp>
+      <p:sp>
+        <p:nvSpPr>
+          <p:cNvPr id="2" name="Title 1">
+            <a:extLst>
+              <a:ext uri="{FF2B5EF4-FFF2-40B4-BE49-F238E27FC236}">
+                <a16:creationId xmlns:a16="http://schemas.microsoft.com/office/drawing/2014/main" id="{2DCC68EC-BB88-4E5F-9D1D-C87E756A747E}"/>
+              </a:ext>
+            </a:extLst>
+          </p:cNvPr>
+          <p:cNvSpPr>
+            <a:spLocks noGrp="1"/>
+          </p:cNvSpPr>
+          <p:nvPr>
+            <p:ph type="title"/>
+          </p:nvPr>
+        </p:nvSpPr>
+        <p:spPr>
+          <a:xfrm>
+            <a:off x="640080" y="2074363"/>
+            <a:ext cx="2752354" cy="2709275"/>
+          </a:xfrm>
+          <a:prstGeom prst="ellipse">
+            <a:avLst/>
+          </a:prstGeom>
+          <a:solidFill>
+            <a:srgbClr val="262626"/>
+          </a:solidFill>
+          <a:ln w="174625" cmpd="thinThick">
+            <a:solidFill>
+              <a:srgbClr val="262626"/>
+            </a:solidFill>
+          </a:ln>
+        </p:spPr>
+        <p:txBody>
+          <a:bodyPr vert="horz" lIns="91440" tIns="45720" rIns="91440" bIns="45720" rtlCol="0" anchor="ctr">
+            <a:normAutofit/>
+          </a:bodyPr>
+          <a:lstStyle/>
+          <a:p>
+            <a:pPr algn="ctr"/>
+            <a:r>
+              <a:rPr lang="en-US" sz="2600" kern="1200">
+                <a:solidFill>
+                  <a:srgbClr val="FFFFFF"/>
+                </a:solidFill>
+                <a:latin typeface="+mj-lt"/>
+                <a:ea typeface="+mj-ea"/>
+                <a:cs typeface="+mj-cs"/>
+              </a:rPr>
+              <a:t>Cosine Similarity</a:t>
+            </a:r>
+          </a:p>
+        </p:txBody>
+      </p:sp>
+      <p:graphicFrame>
+        <p:nvGraphicFramePr>
+          <p:cNvPr id="4" name="Chart 3">
+            <a:extLst>
+              <a:ext uri="{FF2B5EF4-FFF2-40B4-BE49-F238E27FC236}">
+                <a16:creationId xmlns:a16="http://schemas.microsoft.com/office/drawing/2014/main" id="{54F80977-4FB8-48B2-B3BC-E8D596C4F10D}"/>
+              </a:ext>
+            </a:extLst>
+          </p:cNvPr>
+          <p:cNvGraphicFramePr>
+            <a:graphicFrameLocks/>
+          </p:cNvGraphicFramePr>
+          <p:nvPr>
+            <p:extLst>
+              <p:ext uri="{D42A27DB-BD31-4B8C-83A1-F6EECF244321}">
+                <p14:modId xmlns:p14="http://schemas.microsoft.com/office/powerpoint/2010/main" val="264291473"/>
+              </p:ext>
+            </p:extLst>
+          </p:nvPr>
+        </p:nvGraphicFramePr>
+        <p:xfrm>
+          <a:off x="4038600" y="961812"/>
+          <a:ext cx="7188199" cy="4930987"/>
+        </p:xfrm>
+        <a:graphic>
+          <a:graphicData uri="http://schemas.openxmlformats.org/drawingml/2006/chart">
+            <c:chart xmlns:c="http://schemas.openxmlformats.org/drawingml/2006/chart" xmlns:r="http://schemas.openxmlformats.org/officeDocument/2006/relationships" r:id="rId2"/>
+          </a:graphicData>
+        </a:graphic>
+      </p:graphicFrame>
+    </p:spTree>
+    <p:extLst>
+      <p:ext uri="{BB962C8B-B14F-4D97-AF65-F5344CB8AC3E}">
+        <p14:creationId xmlns:p14="http://schemas.microsoft.com/office/powerpoint/2010/main" val="1840081460"/>
+      </p:ext>
+    </p:extLst>
+  </p:cSld>
+  <p:clrMapOvr>
+    <a:masterClrMapping/>
+  </p:clrMapOvr>
+</p:sld>
+</file>
+
+<file path=ppt/slides/slide13.xml><?xml version="1.0" encoding="utf-8"?>
+<p:sld xmlns:a="http://schemas.openxmlformats.org/drawingml/2006/main" xmlns:r="http://schemas.openxmlformats.org/officeDocument/2006/relationships" xmlns:p="http://schemas.openxmlformats.org/presentationml/2006/main">
+  <p:cSld>
+    <p:spTree>
+      <p:nvGrpSpPr>
+        <p:cNvPr id="1" name=""/>
+        <p:cNvGrpSpPr/>
+        <p:nvPr/>
+      </p:nvGrpSpPr>
+      <p:grpSpPr>
+        <a:xfrm>
+          <a:off x="0" y="0"/>
+          <a:ext cx="0" cy="0"/>
+          <a:chOff x="0" y="0"/>
+          <a:chExt cx="0" cy="0"/>
+        </a:xfrm>
+      </p:grpSpPr>
+      <p:sp>
+        <p:nvSpPr>
+          <p:cNvPr id="2" name="Title 1">
+            <a:extLst>
+              <a:ext uri="{FF2B5EF4-FFF2-40B4-BE49-F238E27FC236}">
+                <a16:creationId xmlns:a16="http://schemas.microsoft.com/office/drawing/2014/main" id="{C2B85858-21DB-4E23-ACAF-7C91BFFF0852}"/>
+              </a:ext>
+            </a:extLst>
+          </p:cNvPr>
+          <p:cNvSpPr>
+            <a:spLocks noGrp="1"/>
+          </p:cNvSpPr>
+          <p:nvPr>
+            <p:ph type="title"/>
+          </p:nvPr>
+        </p:nvSpPr>
+        <p:spPr/>
+        <p:txBody>
+          <a:bodyPr/>
+          <a:lstStyle/>
+          <a:p>
+            <a:r>
+              <a:rPr lang="en-US" dirty="0"/>
+              <a:t>Prediction Path</a:t>
+            </a:r>
+          </a:p>
+        </p:txBody>
+      </p:sp>
+      <p:sp>
+        <p:nvSpPr>
+          <p:cNvPr id="3" name="Content Placeholder 2">
+            <a:extLst>
+              <a:ext uri="{FF2B5EF4-FFF2-40B4-BE49-F238E27FC236}">
+                <a16:creationId xmlns:a16="http://schemas.microsoft.com/office/drawing/2014/main" id="{FBAD7512-0804-4383-86E1-74DA72CCFA76}"/>
+              </a:ext>
+            </a:extLst>
+          </p:cNvPr>
+          <p:cNvSpPr>
+            <a:spLocks noGrp="1"/>
+          </p:cNvSpPr>
+          <p:nvPr>
+            <p:ph idx="1"/>
+          </p:nvPr>
+        </p:nvSpPr>
+        <p:spPr/>
+        <p:txBody>
+          <a:bodyPr/>
+          <a:lstStyle/>
+          <a:p>
+            <a:endParaRPr lang="en-US"/>
+          </a:p>
+        </p:txBody>
+      </p:sp>
+    </p:spTree>
+    <p:extLst>
+      <p:ext uri="{BB962C8B-B14F-4D97-AF65-F5344CB8AC3E}">
+        <p14:creationId xmlns:p14="http://schemas.microsoft.com/office/powerpoint/2010/main" val="1805567767"/>
+      </p:ext>
+    </p:extLst>
+  </p:cSld>
+  <p:clrMapOvr>
+    <a:masterClrMapping/>
+  </p:clrMapOvr>
+</p:sld>
+</file>
+
+<file path=ppt/slides/slide14.xml><?xml version="1.0" encoding="utf-8"?>
+<p:sld xmlns:a="http://schemas.openxmlformats.org/drawingml/2006/main" xmlns:r="http://schemas.openxmlformats.org/officeDocument/2006/relationships" xmlns:p="http://schemas.openxmlformats.org/presentationml/2006/main">
+  <p:cSld>
+    <p:bg>
+      <p:bgPr>
+        <a:solidFill>
+          <a:schemeClr val="bg1">
+            <a:tint val="95000"/>
+            <a:satMod val="170000"/>
+          </a:schemeClr>
+        </a:solidFill>
+        <a:effectLst/>
+      </p:bgPr>
+    </p:bg>
+    <p:spTree>
+      <p:nvGrpSpPr>
+        <p:cNvPr id="1" name=""/>
+        <p:cNvGrpSpPr/>
+        <p:nvPr/>
+      </p:nvGrpSpPr>
+      <p:grpSpPr>
+        <a:xfrm>
+          <a:off x="0" y="0"/>
+          <a:ext cx="0" cy="0"/>
+          <a:chOff x="0" y="0"/>
+          <a:chExt cx="0" cy="0"/>
+        </a:xfrm>
+      </p:grpSpPr>
+      <p:sp>
+        <p:nvSpPr>
+          <p:cNvPr id="2" name="Title 1">
+            <a:extLst>
+              <a:ext uri="{FF2B5EF4-FFF2-40B4-BE49-F238E27FC236}">
+                <a16:creationId xmlns:a16="http://schemas.microsoft.com/office/drawing/2014/main" id="{47792EB0-FD0E-45E0-9FD9-B34CB83C8997}"/>
+              </a:ext>
+            </a:extLst>
+          </p:cNvPr>
+          <p:cNvSpPr>
+            <a:spLocks noGrp="1"/>
+          </p:cNvSpPr>
+          <p:nvPr>
+            <p:ph type="title"/>
+          </p:nvPr>
+        </p:nvSpPr>
+        <p:spPr>
+          <a:xfrm>
+            <a:off x="707011" y="4502330"/>
+            <a:ext cx="10765410" cy="1207269"/>
+          </a:xfrm>
+        </p:spPr>
+        <p:txBody>
+          <a:bodyPr vert="horz" lIns="91440" tIns="45720" rIns="91440" bIns="45720" rtlCol="0" anchor="b">
+            <a:normAutofit/>
+          </a:bodyPr>
+          <a:lstStyle/>
+          <a:p>
+            <a:pPr algn="ctr"/>
+            <a:r>
+              <a:rPr lang="en-US" sz="6000"/>
+              <a:t>Android Application</a:t>
+            </a:r>
+          </a:p>
+        </p:txBody>
+      </p:sp>
+      <p:pic>
+        <p:nvPicPr>
+          <p:cNvPr id="6" name="Picture 5">
+            <a:extLst>
+              <a:ext uri="{FF2B5EF4-FFF2-40B4-BE49-F238E27FC236}">
+                <a16:creationId xmlns:a16="http://schemas.microsoft.com/office/drawing/2014/main" id="{51709573-C8CA-482E-8F18-093F45D0C7C3}"/>
+              </a:ext>
+            </a:extLst>
+          </p:cNvPr>
+          <p:cNvPicPr/>
+          <p:nvPr/>
+        </p:nvPicPr>
+        <p:blipFill>
+          <a:blip r:embed="rId2"/>
+          <a:stretch>
+            <a:fillRect/>
+          </a:stretch>
+        </p:blipFill>
+        <p:spPr>
+          <a:xfrm>
+            <a:off x="321734" y="546573"/>
+            <a:ext cx="5458816" cy="3534582"/>
+          </a:xfrm>
+          <a:prstGeom prst="rect">
+            <a:avLst/>
+          </a:prstGeom>
+        </p:spPr>
+      </p:pic>
+      <p:cxnSp>
+        <p:nvCxnSpPr>
+          <p:cNvPr id="42" name="Straight Connector 35">
+            <a:extLst>
+              <a:ext uri="{FF2B5EF4-FFF2-40B4-BE49-F238E27FC236}">
+                <a16:creationId xmlns:a16="http://schemas.microsoft.com/office/drawing/2014/main" id="{3D83F26F-C55B-4A92-9AFF-4894D14E27C5}"/>
+              </a:ext>
+              <a:ext uri="{C183D7F6-B498-43B3-948B-1728B52AA6E4}">
+                <adec:decorative xmlns:adec="http://schemas.microsoft.com/office/drawing/2017/decorative" val="1"/>
+              </a:ext>
+            </a:extLst>
+          </p:cNvPr>
+          <p:cNvCxnSpPr>
+            <a:cxnSpLocks noGrp="1" noRot="1" noChangeAspect="1" noMove="1" noResize="1" noEditPoints="1" noAdjustHandles="1" noChangeArrowheads="1" noChangeShapeType="1"/>
+          </p:cNvCxnSpPr>
+          <p:nvPr>
+            <p:extLst>
+              <p:ext uri="{386F3935-93C4-4BCD-93E2-E3B085C9AB24}">
+                <p16:designElem xmlns:p16="http://schemas.microsoft.com/office/powerpoint/2015/main" val="1"/>
+              </p:ext>
+            </p:extLst>
+          </p:nvPr>
+        </p:nvCxnSpPr>
+        <p:spPr>
+          <a:xfrm>
+            <a:off x="6096000" y="1253414"/>
+            <a:ext cx="0" cy="2120900"/>
+          </a:xfrm>
+          <a:prstGeom prst="line">
+            <a:avLst/>
+          </a:prstGeom>
+          <a:ln w="19050">
+            <a:solidFill>
+              <a:schemeClr val="tx1">
+                <a:lumMod val="75000"/>
+                <a:lumOff val="25000"/>
+              </a:schemeClr>
+            </a:solidFill>
+          </a:ln>
+        </p:spPr>
+        <p:style>
+          <a:lnRef idx="1">
+            <a:schemeClr val="accent1"/>
+          </a:lnRef>
+          <a:fillRef idx="0">
+            <a:schemeClr val="accent1"/>
+          </a:fillRef>
+          <a:effectRef idx="0">
+            <a:schemeClr val="accent1"/>
+          </a:effectRef>
+          <a:fontRef idx="minor">
+            <a:schemeClr val="tx1"/>
+          </a:fontRef>
+        </p:style>
+      </p:cxnSp>
+      <p:pic>
+        <p:nvPicPr>
+          <p:cNvPr id="4" name="Picture 3">
+            <a:extLst>
+              <a:ext uri="{FF2B5EF4-FFF2-40B4-BE49-F238E27FC236}">
+                <a16:creationId xmlns:a16="http://schemas.microsoft.com/office/drawing/2014/main" id="{8ABA873A-06B7-4E5E-A033-53E77B4A9C95}"/>
+              </a:ext>
+            </a:extLst>
+          </p:cNvPr>
+          <p:cNvPicPr/>
+          <p:nvPr/>
+        </p:nvPicPr>
+        <p:blipFill>
+          <a:blip r:embed="rId3"/>
+          <a:stretch>
+            <a:fillRect/>
+          </a:stretch>
+        </p:blipFill>
+        <p:spPr>
+          <a:xfrm>
+            <a:off x="6411450" y="423751"/>
+            <a:ext cx="5458813" cy="3780227"/>
+          </a:xfrm>
+          <a:prstGeom prst="rect">
+            <a:avLst/>
+          </a:prstGeom>
+        </p:spPr>
+      </p:pic>
+    </p:spTree>
+    <p:extLst>
+      <p:ext uri="{BB962C8B-B14F-4D97-AF65-F5344CB8AC3E}">
+        <p14:creationId xmlns:p14="http://schemas.microsoft.com/office/powerpoint/2010/main" val="1910363171"/>
+      </p:ext>
+    </p:extLst>
+  </p:cSld>
+  <p:clrMapOvr>
+    <a:overrideClrMapping bg1="dk1" tx1="lt1" bg2="dk2" tx2="lt2" accent1="accent1" accent2="accent2" accent3="accent3" accent4="accent4" accent5="accent5" accent6="accent6" hlink="hlink" folHlink="folHlink"/>
+  </p:clrMapOvr>
+</p:sld>
+</file>
+
 <file path=ppt/slides/slide2.xml><?xml version="1.0" encoding="utf-8"?>
 <p:sld xmlns:a="http://schemas.openxmlformats.org/drawingml/2006/main" xmlns:r="http://schemas.openxmlformats.org/officeDocument/2006/relationships" xmlns:p="http://schemas.openxmlformats.org/presentationml/2006/main">
   <p:cSld>
@@ -4380,7 +6804,7 @@
           <a:p>
             <a:r>
               <a:rPr lang="en-US" dirty="0"/>
-              <a:t>Your location data can comes from:</a:t>
+              <a:t>Facts</a:t>
             </a:r>
           </a:p>
         </p:txBody>
@@ -4408,19 +6832,7 @@
           <a:p>
             <a:r>
               <a:rPr lang="en-US" dirty="0"/>
-              <a:t>Phone/computer GPS</a:t>
-            </a:r>
-          </a:p>
-          <a:p>
-            <a:r>
-              <a:rPr lang="en-US" dirty="0"/>
-              <a:t>…..</a:t>
-            </a:r>
-          </a:p>
-          <a:p>
-            <a:r>
-              <a:rPr lang="en-US" dirty="0"/>
-              <a:t>Imagine after the time we have driverless Cars</a:t>
+              <a:t>91% of the Americans have lost control on their private data</a:t>
             </a:r>
           </a:p>
         </p:txBody>
@@ -4548,6 +6960,14 @@
 <file path=ppt/slides/slide5.xml><?xml version="1.0" encoding="utf-8"?>
 <p:sld xmlns:a="http://schemas.openxmlformats.org/drawingml/2006/main" xmlns:r="http://schemas.openxmlformats.org/officeDocument/2006/relationships" xmlns:p="http://schemas.openxmlformats.org/presentationml/2006/main">
   <p:cSld>
+    <p:bg>
+      <p:bgPr>
+        <a:solidFill>
+          <a:schemeClr val="bg1"/>
+        </a:solidFill>
+        <a:effectLst/>
+      </p:bgPr>
+    </p:bg>
     <p:spTree>
       <p:nvGrpSpPr>
         <p:cNvPr id="1" name=""/>
@@ -4564,6 +6984,132 @@
       </p:grpSpPr>
       <p:sp>
         <p:nvSpPr>
+          <p:cNvPr id="9" name="Rectangle 8">
+            <a:extLst>
+              <a:ext uri="{FF2B5EF4-FFF2-40B4-BE49-F238E27FC236}">
+                <a16:creationId xmlns:a16="http://schemas.microsoft.com/office/drawing/2014/main" id="{6753252F-4873-4F63-801D-CC719279A7D5}"/>
+              </a:ext>
+              <a:ext uri="{C183D7F6-B498-43B3-948B-1728B52AA6E4}">
+                <adec:decorative xmlns:adec="http://schemas.microsoft.com/office/drawing/2017/decorative" val="1"/>
+              </a:ext>
+            </a:extLst>
+          </p:cNvPr>
+          <p:cNvSpPr>
+            <a:spLocks noGrp="1" noRot="1" noChangeAspect="1" noMove="1" noResize="1" noEditPoints="1" noAdjustHandles="1" noChangeArrowheads="1" noChangeShapeType="1" noTextEdit="1"/>
+          </p:cNvSpPr>
+          <p:nvPr>
+            <p:extLst>
+              <p:ext uri="{386F3935-93C4-4BCD-93E2-E3B085C9AB24}">
+                <p16:designElem xmlns:p16="http://schemas.microsoft.com/office/powerpoint/2015/main" val="1"/>
+              </p:ext>
+            </p:extLst>
+          </p:nvPr>
+        </p:nvSpPr>
+        <p:spPr>
+          <a:xfrm>
+            <a:off x="0" y="0"/>
+            <a:ext cx="12192000" cy="6858000"/>
+          </a:xfrm>
+          <a:prstGeom prst="rect">
+            <a:avLst/>
+          </a:prstGeom>
+          <a:solidFill>
+            <a:srgbClr val="FFFFFF"/>
+          </a:solidFill>
+          <a:ln>
+            <a:noFill/>
+          </a:ln>
+        </p:spPr>
+        <p:style>
+          <a:lnRef idx="2">
+            <a:schemeClr val="accent1">
+              <a:shade val="50000"/>
+            </a:schemeClr>
+          </a:lnRef>
+          <a:fillRef idx="1">
+            <a:schemeClr val="accent1"/>
+          </a:fillRef>
+          <a:effectRef idx="0">
+            <a:schemeClr val="accent1"/>
+          </a:effectRef>
+          <a:fontRef idx="minor">
+            <a:schemeClr val="lt1"/>
+          </a:fontRef>
+        </p:style>
+        <p:txBody>
+          <a:bodyPr rtlCol="0" anchor="ctr"/>
+          <a:lstStyle/>
+          <a:p>
+            <a:pPr algn="ctr"/>
+            <a:endParaRPr lang="en-US"/>
+          </a:p>
+        </p:txBody>
+      </p:sp>
+      <p:sp>
+        <p:nvSpPr>
+          <p:cNvPr id="11" name="Rectangle 10">
+            <a:extLst>
+              <a:ext uri="{FF2B5EF4-FFF2-40B4-BE49-F238E27FC236}">
+                <a16:creationId xmlns:a16="http://schemas.microsoft.com/office/drawing/2014/main" id="{047C8CCB-F95D-4249-92DD-651249D3535A}"/>
+              </a:ext>
+              <a:ext uri="{C183D7F6-B498-43B3-948B-1728B52AA6E4}">
+                <adec:decorative xmlns:adec="http://schemas.microsoft.com/office/drawing/2017/decorative" val="1"/>
+              </a:ext>
+            </a:extLst>
+          </p:cNvPr>
+          <p:cNvSpPr>
+            <a:spLocks noGrp="1" noRot="1" noChangeAspect="1" noMove="1" noResize="1" noEditPoints="1" noAdjustHandles="1" noChangeArrowheads="1" noChangeShapeType="1" noTextEdit="1"/>
+          </p:cNvSpPr>
+          <p:nvPr>
+            <p:extLst>
+              <p:ext uri="{386F3935-93C4-4BCD-93E2-E3B085C9AB24}">
+                <p16:designElem xmlns:p16="http://schemas.microsoft.com/office/powerpoint/2015/main" val="1"/>
+              </p:ext>
+            </p:extLst>
+          </p:nvPr>
+        </p:nvSpPr>
+        <p:spPr>
+          <a:xfrm>
+            <a:off x="0" y="0"/>
+            <a:ext cx="2013557" cy="6858000"/>
+          </a:xfrm>
+          <a:prstGeom prst="rect">
+            <a:avLst/>
+          </a:prstGeom>
+          <a:solidFill>
+            <a:srgbClr val="7F7F7F"/>
+          </a:solidFill>
+          <a:ln>
+            <a:noFill/>
+          </a:ln>
+        </p:spPr>
+        <p:style>
+          <a:lnRef idx="2">
+            <a:schemeClr val="accent1">
+              <a:shade val="50000"/>
+            </a:schemeClr>
+          </a:lnRef>
+          <a:fillRef idx="1">
+            <a:schemeClr val="accent1"/>
+          </a:fillRef>
+          <a:effectRef idx="0">
+            <a:schemeClr val="accent1"/>
+          </a:effectRef>
+          <a:fontRef idx="minor">
+            <a:schemeClr val="lt1"/>
+          </a:fontRef>
+        </p:style>
+        <p:txBody>
+          <a:bodyPr rtlCol="0" anchor="ctr"/>
+          <a:lstStyle/>
+          <a:p>
+            <a:pPr algn="ctr"/>
+            <a:endParaRPr lang="en-US"/>
+          </a:p>
+        </p:txBody>
+      </p:sp>
+      <p:sp>
+        <p:nvSpPr>
           <p:cNvPr id="2" name="Title 1">
             <a:extLst>
               <a:ext uri="{FF2B5EF4-FFF2-40B4-BE49-F238E27FC236}">
@@ -4578,44 +7124,1125 @@
             <p:ph type="title"/>
           </p:nvPr>
         </p:nvSpPr>
-        <p:spPr/>
-        <p:txBody>
-          <a:bodyPr/>
-          <a:lstStyle/>
-          <a:p>
-            <a:endParaRPr lang="en-US"/>
-          </a:p>
-        </p:txBody>
-      </p:sp>
-      <p:sp>
-        <p:nvSpPr>
-          <p:cNvPr id="3" name="Content Placeholder 2">
-            <a:extLst>
-              <a:ext uri="{FF2B5EF4-FFF2-40B4-BE49-F238E27FC236}">
-                <a16:creationId xmlns:a16="http://schemas.microsoft.com/office/drawing/2014/main" id="{496BFF43-C177-41A1-A79D-9274183F00A5}"/>
-              </a:ext>
-            </a:extLst>
-          </p:cNvPr>
-          <p:cNvSpPr>
-            <a:spLocks noGrp="1"/>
-          </p:cNvSpPr>
-          <p:nvPr>
-            <p:ph idx="1"/>
-          </p:nvPr>
-        </p:nvSpPr>
-        <p:spPr/>
-        <p:txBody>
-          <a:bodyPr/>
-          <a:lstStyle/>
-          <a:p>
-            <a:endParaRPr lang="en-US"/>
-          </a:p>
-        </p:txBody>
-      </p:sp>
+        <p:spPr>
+          <a:xfrm>
+            <a:off x="640080" y="2074363"/>
+            <a:ext cx="2752354" cy="2709275"/>
+          </a:xfrm>
+          <a:prstGeom prst="ellipse">
+            <a:avLst/>
+          </a:prstGeom>
+          <a:solidFill>
+            <a:srgbClr val="262626"/>
+          </a:solidFill>
+          <a:ln w="174625" cmpd="thinThick">
+            <a:solidFill>
+              <a:srgbClr val="262626"/>
+            </a:solidFill>
+          </a:ln>
+        </p:spPr>
+        <p:txBody>
+          <a:bodyPr vert="horz" lIns="91440" tIns="45720" rIns="91440" bIns="45720" rtlCol="0" anchor="ctr">
+            <a:normAutofit/>
+          </a:bodyPr>
+          <a:lstStyle/>
+          <a:p>
+            <a:pPr algn="ctr"/>
+            <a:r>
+              <a:rPr lang="en-US" sz="2600" kern="1200">
+                <a:solidFill>
+                  <a:srgbClr val="FFFFFF"/>
+                </a:solidFill>
+                <a:latin typeface="+mj-lt"/>
+                <a:ea typeface="+mj-ea"/>
+                <a:cs typeface="+mj-cs"/>
+              </a:rPr>
+              <a:t>Flowchart</a:t>
+            </a:r>
+          </a:p>
+        </p:txBody>
+      </p:sp>
+      <p:pic>
+        <p:nvPicPr>
+          <p:cNvPr id="4" name="Picture 3">
+            <a:extLst>
+              <a:ext uri="{FF2B5EF4-FFF2-40B4-BE49-F238E27FC236}">
+                <a16:creationId xmlns:a16="http://schemas.microsoft.com/office/drawing/2014/main" id="{EBF97308-6B86-45C2-B675-438D7387A567}"/>
+              </a:ext>
+            </a:extLst>
+          </p:cNvPr>
+          <p:cNvPicPr/>
+          <p:nvPr/>
+        </p:nvPicPr>
+        <p:blipFill>
+          <a:blip r:embed="rId2"/>
+          <a:stretch>
+            <a:fillRect/>
+          </a:stretch>
+        </p:blipFill>
+        <p:spPr>
+          <a:xfrm>
+            <a:off x="3543300" y="285750"/>
+            <a:ext cx="8391525" cy="6372225"/>
+          </a:xfrm>
+          <a:prstGeom prst="rect">
+            <a:avLst/>
+          </a:prstGeom>
+        </p:spPr>
+      </p:pic>
     </p:spTree>
     <p:extLst>
       <p:ext uri="{BB962C8B-B14F-4D97-AF65-F5344CB8AC3E}">
         <p14:creationId xmlns:p14="http://schemas.microsoft.com/office/powerpoint/2010/main" val="2760753422"/>
+      </p:ext>
+    </p:extLst>
+  </p:cSld>
+  <p:clrMapOvr>
+    <a:masterClrMapping/>
+  </p:clrMapOvr>
+</p:sld>
+</file>
+
+<file path=ppt/slides/slide6.xml><?xml version="1.0" encoding="utf-8"?>
+<p:sld xmlns:a="http://schemas.openxmlformats.org/drawingml/2006/main" xmlns:r="http://schemas.openxmlformats.org/officeDocument/2006/relationships" xmlns:p="http://schemas.openxmlformats.org/presentationml/2006/main">
+  <p:cSld>
+    <p:bg>
+      <p:bgPr>
+        <a:solidFill>
+          <a:schemeClr val="bg1"/>
+        </a:solidFill>
+        <a:effectLst/>
+      </p:bgPr>
+    </p:bg>
+    <p:spTree>
+      <p:nvGrpSpPr>
+        <p:cNvPr id="1" name=""/>
+        <p:cNvGrpSpPr/>
+        <p:nvPr/>
+      </p:nvGrpSpPr>
+      <p:grpSpPr>
+        <a:xfrm>
+          <a:off x="0" y="0"/>
+          <a:ext cx="0" cy="0"/>
+          <a:chOff x="0" y="0"/>
+          <a:chExt cx="0" cy="0"/>
+        </a:xfrm>
+      </p:grpSpPr>
+      <p:sp>
+        <p:nvSpPr>
+          <p:cNvPr id="9" name="Rectangle 8">
+            <a:extLst>
+              <a:ext uri="{FF2B5EF4-FFF2-40B4-BE49-F238E27FC236}">
+                <a16:creationId xmlns:a16="http://schemas.microsoft.com/office/drawing/2014/main" id="{6753252F-4873-4F63-801D-CC719279A7D5}"/>
+              </a:ext>
+              <a:ext uri="{C183D7F6-B498-43B3-948B-1728B52AA6E4}">
+                <adec:decorative xmlns:adec="http://schemas.microsoft.com/office/drawing/2017/decorative" val="1"/>
+              </a:ext>
+            </a:extLst>
+          </p:cNvPr>
+          <p:cNvSpPr>
+            <a:spLocks noGrp="1" noRot="1" noChangeAspect="1" noMove="1" noResize="1" noEditPoints="1" noAdjustHandles="1" noChangeArrowheads="1" noChangeShapeType="1" noTextEdit="1"/>
+          </p:cNvSpPr>
+          <p:nvPr>
+            <p:extLst>
+              <p:ext uri="{386F3935-93C4-4BCD-93E2-E3B085C9AB24}">
+                <p16:designElem xmlns:p16="http://schemas.microsoft.com/office/powerpoint/2015/main" val="1"/>
+              </p:ext>
+            </p:extLst>
+          </p:nvPr>
+        </p:nvSpPr>
+        <p:spPr>
+          <a:xfrm>
+            <a:off x="0" y="0"/>
+            <a:ext cx="12192000" cy="6858000"/>
+          </a:xfrm>
+          <a:prstGeom prst="rect">
+            <a:avLst/>
+          </a:prstGeom>
+          <a:solidFill>
+            <a:srgbClr val="FFFFFF"/>
+          </a:solidFill>
+          <a:ln>
+            <a:noFill/>
+          </a:ln>
+        </p:spPr>
+        <p:style>
+          <a:lnRef idx="2">
+            <a:schemeClr val="accent1">
+              <a:shade val="50000"/>
+            </a:schemeClr>
+          </a:lnRef>
+          <a:fillRef idx="1">
+            <a:schemeClr val="accent1"/>
+          </a:fillRef>
+          <a:effectRef idx="0">
+            <a:schemeClr val="accent1"/>
+          </a:effectRef>
+          <a:fontRef idx="minor">
+            <a:schemeClr val="lt1"/>
+          </a:fontRef>
+        </p:style>
+        <p:txBody>
+          <a:bodyPr rtlCol="0" anchor="ctr"/>
+          <a:lstStyle/>
+          <a:p>
+            <a:pPr algn="ctr"/>
+            <a:endParaRPr lang="en-US"/>
+          </a:p>
+        </p:txBody>
+      </p:sp>
+      <p:sp>
+        <p:nvSpPr>
+          <p:cNvPr id="11" name="Rectangle 10">
+            <a:extLst>
+              <a:ext uri="{FF2B5EF4-FFF2-40B4-BE49-F238E27FC236}">
+                <a16:creationId xmlns:a16="http://schemas.microsoft.com/office/drawing/2014/main" id="{047C8CCB-F95D-4249-92DD-651249D3535A}"/>
+              </a:ext>
+              <a:ext uri="{C183D7F6-B498-43B3-948B-1728B52AA6E4}">
+                <adec:decorative xmlns:adec="http://schemas.microsoft.com/office/drawing/2017/decorative" val="1"/>
+              </a:ext>
+            </a:extLst>
+          </p:cNvPr>
+          <p:cNvSpPr>
+            <a:spLocks noGrp="1" noRot="1" noChangeAspect="1" noMove="1" noResize="1" noEditPoints="1" noAdjustHandles="1" noChangeArrowheads="1" noChangeShapeType="1" noTextEdit="1"/>
+          </p:cNvSpPr>
+          <p:nvPr>
+            <p:extLst>
+              <p:ext uri="{386F3935-93C4-4BCD-93E2-E3B085C9AB24}">
+                <p16:designElem xmlns:p16="http://schemas.microsoft.com/office/powerpoint/2015/main" val="1"/>
+              </p:ext>
+            </p:extLst>
+          </p:nvPr>
+        </p:nvSpPr>
+        <p:spPr>
+          <a:xfrm>
+            <a:off x="0" y="0"/>
+            <a:ext cx="2013557" cy="6858000"/>
+          </a:xfrm>
+          <a:prstGeom prst="rect">
+            <a:avLst/>
+          </a:prstGeom>
+          <a:solidFill>
+            <a:srgbClr val="7F7F7F"/>
+          </a:solidFill>
+          <a:ln>
+            <a:noFill/>
+          </a:ln>
+        </p:spPr>
+        <p:style>
+          <a:lnRef idx="2">
+            <a:schemeClr val="accent1">
+              <a:shade val="50000"/>
+            </a:schemeClr>
+          </a:lnRef>
+          <a:fillRef idx="1">
+            <a:schemeClr val="accent1"/>
+          </a:fillRef>
+          <a:effectRef idx="0">
+            <a:schemeClr val="accent1"/>
+          </a:effectRef>
+          <a:fontRef idx="minor">
+            <a:schemeClr val="lt1"/>
+          </a:fontRef>
+        </p:style>
+        <p:txBody>
+          <a:bodyPr rtlCol="0" anchor="ctr"/>
+          <a:lstStyle/>
+          <a:p>
+            <a:pPr algn="ctr"/>
+            <a:endParaRPr lang="en-US"/>
+          </a:p>
+        </p:txBody>
+      </p:sp>
+      <p:sp>
+        <p:nvSpPr>
+          <p:cNvPr id="2" name="Title 1">
+            <a:extLst>
+              <a:ext uri="{FF2B5EF4-FFF2-40B4-BE49-F238E27FC236}">
+                <a16:creationId xmlns:a16="http://schemas.microsoft.com/office/drawing/2014/main" id="{DA38F4CB-21F3-40C0-9785-0788AA786C26}"/>
+              </a:ext>
+            </a:extLst>
+          </p:cNvPr>
+          <p:cNvSpPr>
+            <a:spLocks noGrp="1"/>
+          </p:cNvSpPr>
+          <p:nvPr>
+            <p:ph type="title"/>
+          </p:nvPr>
+        </p:nvSpPr>
+        <p:spPr>
+          <a:xfrm>
+            <a:off x="640080" y="2074363"/>
+            <a:ext cx="2752354" cy="2709275"/>
+          </a:xfrm>
+          <a:prstGeom prst="ellipse">
+            <a:avLst/>
+          </a:prstGeom>
+          <a:solidFill>
+            <a:srgbClr val="262626"/>
+          </a:solidFill>
+          <a:ln w="174625" cmpd="thinThick">
+            <a:solidFill>
+              <a:srgbClr val="262626"/>
+            </a:solidFill>
+          </a:ln>
+        </p:spPr>
+        <p:txBody>
+          <a:bodyPr vert="horz" lIns="91440" tIns="45720" rIns="91440" bIns="45720" rtlCol="0" anchor="ctr">
+            <a:normAutofit/>
+          </a:bodyPr>
+          <a:lstStyle/>
+          <a:p>
+            <a:pPr algn="ctr"/>
+            <a:r>
+              <a:rPr lang="en-US" sz="2600" kern="1200">
+                <a:solidFill>
+                  <a:srgbClr val="FFFFFF"/>
+                </a:solidFill>
+                <a:latin typeface="+mj-lt"/>
+                <a:ea typeface="+mj-ea"/>
+                <a:cs typeface="+mj-cs"/>
+              </a:rPr>
+              <a:t>Raw GPS Points to Markov Chain</a:t>
+            </a:r>
+          </a:p>
+        </p:txBody>
+      </p:sp>
+      <p:pic>
+        <p:nvPicPr>
+          <p:cNvPr id="4" name="Picture 3">
+            <a:extLst>
+              <a:ext uri="{FF2B5EF4-FFF2-40B4-BE49-F238E27FC236}">
+                <a16:creationId xmlns:a16="http://schemas.microsoft.com/office/drawing/2014/main" id="{BDA024D3-5F67-4A9F-86AF-A1462E9BF6C0}"/>
+              </a:ext>
+            </a:extLst>
+          </p:cNvPr>
+          <p:cNvPicPr/>
+          <p:nvPr/>
+        </p:nvPicPr>
+        <p:blipFill>
+          <a:blip r:embed="rId2"/>
+          <a:stretch>
+            <a:fillRect/>
+          </a:stretch>
+        </p:blipFill>
+        <p:spPr>
+          <a:xfrm>
+            <a:off x="3571875" y="828675"/>
+            <a:ext cx="8439149" cy="5676900"/>
+          </a:xfrm>
+          <a:prstGeom prst="rect">
+            <a:avLst/>
+          </a:prstGeom>
+        </p:spPr>
+      </p:pic>
+    </p:spTree>
+    <p:extLst>
+      <p:ext uri="{BB962C8B-B14F-4D97-AF65-F5344CB8AC3E}">
+        <p14:creationId xmlns:p14="http://schemas.microsoft.com/office/powerpoint/2010/main" val="2690313151"/>
+      </p:ext>
+    </p:extLst>
+  </p:cSld>
+  <p:clrMapOvr>
+    <a:masterClrMapping/>
+  </p:clrMapOvr>
+</p:sld>
+</file>
+
+<file path=ppt/slides/slide7.xml><?xml version="1.0" encoding="utf-8"?>
+<p:sld xmlns:a="http://schemas.openxmlformats.org/drawingml/2006/main" xmlns:r="http://schemas.openxmlformats.org/officeDocument/2006/relationships" xmlns:p="http://schemas.openxmlformats.org/presentationml/2006/main">
+  <p:cSld>
+    <p:bg>
+      <p:bgPr>
+        <a:solidFill>
+          <a:schemeClr val="bg1"/>
+        </a:solidFill>
+        <a:effectLst/>
+      </p:bgPr>
+    </p:bg>
+    <p:spTree>
+      <p:nvGrpSpPr>
+        <p:cNvPr id="1" name=""/>
+        <p:cNvGrpSpPr/>
+        <p:nvPr/>
+      </p:nvGrpSpPr>
+      <p:grpSpPr>
+        <a:xfrm>
+          <a:off x="0" y="0"/>
+          <a:ext cx="0" cy="0"/>
+          <a:chOff x="0" y="0"/>
+          <a:chExt cx="0" cy="0"/>
+        </a:xfrm>
+      </p:grpSpPr>
+      <p:sp>
+        <p:nvSpPr>
+          <p:cNvPr id="12" name="Rectangle 11">
+            <a:extLst>
+              <a:ext uri="{FF2B5EF4-FFF2-40B4-BE49-F238E27FC236}">
+                <a16:creationId xmlns:a16="http://schemas.microsoft.com/office/drawing/2014/main" id="{823AC064-BC96-4F32-8AE1-B2FD38754823}"/>
+              </a:ext>
+              <a:ext uri="{C183D7F6-B498-43B3-948B-1728B52AA6E4}">
+                <adec:decorative xmlns:adec="http://schemas.microsoft.com/office/drawing/2017/decorative" val="1"/>
+              </a:ext>
+            </a:extLst>
+          </p:cNvPr>
+          <p:cNvSpPr>
+            <a:spLocks noGrp="1" noRot="1" noChangeAspect="1" noMove="1" noResize="1" noEditPoints="1" noAdjustHandles="1" noChangeArrowheads="1" noChangeShapeType="1" noTextEdit="1"/>
+          </p:cNvSpPr>
+          <p:nvPr>
+            <p:extLst>
+              <p:ext uri="{386F3935-93C4-4BCD-93E2-E3B085C9AB24}">
+                <p16:designElem xmlns:p16="http://schemas.microsoft.com/office/powerpoint/2015/main" val="1"/>
+              </p:ext>
+            </p:extLst>
+          </p:nvPr>
+        </p:nvSpPr>
+        <p:spPr bwMode="ltGray">
+          <a:xfrm>
+            <a:off x="396882" y="280374"/>
+            <a:ext cx="11438793" cy="1844256"/>
+          </a:xfrm>
+          <a:prstGeom prst="rect">
+            <a:avLst/>
+          </a:prstGeom>
+          <a:solidFill>
+            <a:srgbClr val="404040"/>
+          </a:solidFill>
+          <a:ln w="127000" cap="sq" cmpd="thinThick">
+            <a:solidFill>
+              <a:srgbClr val="404040"/>
+            </a:solidFill>
+          </a:ln>
+        </p:spPr>
+        <p:style>
+          <a:lnRef idx="2">
+            <a:schemeClr val="accent1">
+              <a:shade val="50000"/>
+            </a:schemeClr>
+          </a:lnRef>
+          <a:fillRef idx="1">
+            <a:schemeClr val="accent1"/>
+          </a:fillRef>
+          <a:effectRef idx="0">
+            <a:schemeClr val="accent1"/>
+          </a:effectRef>
+          <a:fontRef idx="minor">
+            <a:schemeClr val="lt1"/>
+          </a:fontRef>
+        </p:style>
+        <p:txBody>
+          <a:bodyPr rtlCol="0" anchor="ctr"/>
+          <a:lstStyle/>
+          <a:p>
+            <a:pPr algn="ctr"/>
+            <a:endParaRPr lang="en-US"/>
+          </a:p>
+        </p:txBody>
+      </p:sp>
+      <p:sp>
+        <p:nvSpPr>
+          <p:cNvPr id="2" name="Title 1">
+            <a:extLst>
+              <a:ext uri="{FF2B5EF4-FFF2-40B4-BE49-F238E27FC236}">
+                <a16:creationId xmlns:a16="http://schemas.microsoft.com/office/drawing/2014/main" id="{B769C6B0-7BFA-4F3C-B51B-84A543A65D1B}"/>
+              </a:ext>
+            </a:extLst>
+          </p:cNvPr>
+          <p:cNvSpPr>
+            <a:spLocks noGrp="1"/>
+          </p:cNvSpPr>
+          <p:nvPr>
+            <p:ph type="title"/>
+          </p:nvPr>
+        </p:nvSpPr>
+        <p:spPr>
+          <a:xfrm>
+            <a:off x="546351" y="433545"/>
+            <a:ext cx="11139854" cy="930447"/>
+          </a:xfrm>
+        </p:spPr>
+        <p:txBody>
+          <a:bodyPr vert="horz" lIns="91440" tIns="45720" rIns="91440" bIns="45720" rtlCol="0" anchor="b">
+            <a:normAutofit/>
+          </a:bodyPr>
+          <a:lstStyle/>
+          <a:p>
+            <a:pPr algn="ctr"/>
+            <a:r>
+              <a:rPr lang="en-US" sz="5400">
+                <a:solidFill>
+                  <a:srgbClr val="FFFFFF"/>
+                </a:solidFill>
+              </a:rPr>
+              <a:t>Markov Model</a:t>
+            </a:r>
+          </a:p>
+        </p:txBody>
+      </p:sp>
+      <p:cxnSp>
+        <p:nvCxnSpPr>
+          <p:cNvPr id="14" name="Straight Connector 13">
+            <a:extLst>
+              <a:ext uri="{FF2B5EF4-FFF2-40B4-BE49-F238E27FC236}">
+                <a16:creationId xmlns:a16="http://schemas.microsoft.com/office/drawing/2014/main" id="{7E7C77BC-7138-40B1-A15B-20F57A494629}"/>
+              </a:ext>
+              <a:ext uri="{C183D7F6-B498-43B3-948B-1728B52AA6E4}">
+                <adec:decorative xmlns:adec="http://schemas.microsoft.com/office/drawing/2017/decorative" val="1"/>
+              </a:ext>
+            </a:extLst>
+          </p:cNvPr>
+          <p:cNvCxnSpPr>
+            <a:cxnSpLocks noGrp="1" noRot="1" noChangeAspect="1" noMove="1" noResize="1" noEditPoints="1" noAdjustHandles="1" noChangeArrowheads="1" noChangeShapeType="1"/>
+          </p:cNvCxnSpPr>
+          <p:nvPr>
+            <p:extLst>
+              <p:ext uri="{386F3935-93C4-4BCD-93E2-E3B085C9AB24}">
+                <p16:designElem xmlns:p16="http://schemas.microsoft.com/office/powerpoint/2015/main" val="1"/>
+              </p:ext>
+            </p:extLst>
+          </p:nvPr>
+        </p:nvCxnSpPr>
+        <p:spPr>
+          <a:xfrm>
+            <a:off x="2230078" y="1522292"/>
+            <a:ext cx="7772400" cy="0"/>
+          </a:xfrm>
+          <a:prstGeom prst="line">
+            <a:avLst/>
+          </a:prstGeom>
+          <a:ln w="22225">
+            <a:solidFill>
+              <a:srgbClr val="D9D9D9"/>
+            </a:solidFill>
+          </a:ln>
+        </p:spPr>
+        <p:style>
+          <a:lnRef idx="1">
+            <a:schemeClr val="accent1"/>
+          </a:lnRef>
+          <a:fillRef idx="0">
+            <a:schemeClr val="accent1"/>
+          </a:fillRef>
+          <a:effectRef idx="0">
+            <a:schemeClr val="accent1"/>
+          </a:effectRef>
+          <a:fontRef idx="minor">
+            <a:schemeClr val="tx1"/>
+          </a:fontRef>
+        </p:style>
+      </p:cxnSp>
+      <p:pic>
+        <p:nvPicPr>
+          <p:cNvPr id="4" name="Picture 3">
+            <a:extLst>
+              <a:ext uri="{FF2B5EF4-FFF2-40B4-BE49-F238E27FC236}">
+                <a16:creationId xmlns:a16="http://schemas.microsoft.com/office/drawing/2014/main" id="{03F5065F-E70E-45E9-A645-D212B6674C25}"/>
+              </a:ext>
+            </a:extLst>
+          </p:cNvPr>
+          <p:cNvPicPr/>
+          <p:nvPr/>
+        </p:nvPicPr>
+        <p:blipFill>
+          <a:blip r:embed="rId2"/>
+          <a:stretch>
+            <a:fillRect/>
+          </a:stretch>
+        </p:blipFill>
+        <p:spPr>
+          <a:xfrm>
+            <a:off x="807336" y="2426818"/>
+            <a:ext cx="4504379" cy="3997637"/>
+          </a:xfrm>
+          <a:prstGeom prst="rect">
+            <a:avLst/>
+          </a:prstGeom>
+        </p:spPr>
+      </p:pic>
+      <p:cxnSp>
+        <p:nvCxnSpPr>
+          <p:cNvPr id="16" name="Straight Connector 15">
+            <a:extLst>
+              <a:ext uri="{FF2B5EF4-FFF2-40B4-BE49-F238E27FC236}">
+                <a16:creationId xmlns:a16="http://schemas.microsoft.com/office/drawing/2014/main" id="{DB146403-F3D6-484B-B2ED-97F9565D0370}"/>
+              </a:ext>
+              <a:ext uri="{C183D7F6-B498-43B3-948B-1728B52AA6E4}">
+                <adec:decorative xmlns:adec="http://schemas.microsoft.com/office/drawing/2017/decorative" val="1"/>
+              </a:ext>
+            </a:extLst>
+          </p:cNvPr>
+          <p:cNvCxnSpPr>
+            <a:cxnSpLocks noGrp="1" noRot="1" noChangeAspect="1" noMove="1" noResize="1" noEditPoints="1" noAdjustHandles="1" noChangeArrowheads="1" noChangeShapeType="1"/>
+          </p:cNvCxnSpPr>
+          <p:nvPr>
+            <p:extLst>
+              <p:ext uri="{386F3935-93C4-4BCD-93E2-E3B085C9AB24}">
+                <p16:designElem xmlns:p16="http://schemas.microsoft.com/office/powerpoint/2015/main" val="1"/>
+              </p:ext>
+            </p:extLst>
+          </p:nvPr>
+        </p:nvCxnSpPr>
+        <p:spPr>
+          <a:xfrm>
+            <a:off x="6116278" y="2596836"/>
+            <a:ext cx="0" cy="3657600"/>
+          </a:xfrm>
+          <a:prstGeom prst="line">
+            <a:avLst/>
+          </a:prstGeom>
+          <a:ln w="101600" cmpd="dbl">
+            <a:solidFill>
+              <a:srgbClr val="595959"/>
+            </a:solidFill>
+          </a:ln>
+        </p:spPr>
+        <p:style>
+          <a:lnRef idx="1">
+            <a:schemeClr val="accent1"/>
+          </a:lnRef>
+          <a:fillRef idx="0">
+            <a:schemeClr val="accent1"/>
+          </a:fillRef>
+          <a:effectRef idx="0">
+            <a:schemeClr val="accent1"/>
+          </a:effectRef>
+          <a:fontRef idx="minor">
+            <a:schemeClr val="tx1"/>
+          </a:fontRef>
+        </p:style>
+      </p:cxnSp>
+      <p:pic>
+        <p:nvPicPr>
+          <p:cNvPr id="7" name="Picture 6">
+            <a:extLst>
+              <a:ext uri="{FF2B5EF4-FFF2-40B4-BE49-F238E27FC236}">
+                <a16:creationId xmlns:a16="http://schemas.microsoft.com/office/drawing/2014/main" id="{B9FCF1F0-7DEF-4DE6-A285-199CBD20DBBF}"/>
+              </a:ext>
+            </a:extLst>
+          </p:cNvPr>
+          <p:cNvPicPr/>
+          <p:nvPr/>
+        </p:nvPicPr>
+        <p:blipFill>
+          <a:blip r:embed="rId3"/>
+          <a:stretch>
+            <a:fillRect/>
+          </a:stretch>
+        </p:blipFill>
+        <p:spPr>
+          <a:xfrm>
+            <a:off x="6445073" y="2933701"/>
+            <a:ext cx="5455917" cy="2789232"/>
+          </a:xfrm>
+          <a:prstGeom prst="rect">
+            <a:avLst/>
+          </a:prstGeom>
+        </p:spPr>
+      </p:pic>
+    </p:spTree>
+    <p:extLst>
+      <p:ext uri="{BB962C8B-B14F-4D97-AF65-F5344CB8AC3E}">
+        <p14:creationId xmlns:p14="http://schemas.microsoft.com/office/powerpoint/2010/main" val="3432831688"/>
+      </p:ext>
+    </p:extLst>
+  </p:cSld>
+  <p:clrMapOvr>
+    <a:masterClrMapping/>
+  </p:clrMapOvr>
+</p:sld>
+</file>
+
+<file path=ppt/slides/slide8.xml><?xml version="1.0" encoding="utf-8"?>
+<p:sld xmlns:a="http://schemas.openxmlformats.org/drawingml/2006/main" xmlns:r="http://schemas.openxmlformats.org/officeDocument/2006/relationships" xmlns:p="http://schemas.openxmlformats.org/presentationml/2006/main">
+  <p:cSld>
+    <p:bg>
+      <p:bgPr>
+        <a:solidFill>
+          <a:schemeClr val="bg1"/>
+        </a:solidFill>
+        <a:effectLst/>
+      </p:bgPr>
+    </p:bg>
+    <p:spTree>
+      <p:nvGrpSpPr>
+        <p:cNvPr id="1" name=""/>
+        <p:cNvGrpSpPr/>
+        <p:nvPr/>
+      </p:nvGrpSpPr>
+      <p:grpSpPr>
+        <a:xfrm>
+          <a:off x="0" y="0"/>
+          <a:ext cx="0" cy="0"/>
+          <a:chOff x="0" y="0"/>
+          <a:chExt cx="0" cy="0"/>
+        </a:xfrm>
+      </p:grpSpPr>
+      <p:sp>
+        <p:nvSpPr>
+          <p:cNvPr id="9" name="Rectangle 8">
+            <a:extLst>
+              <a:ext uri="{FF2B5EF4-FFF2-40B4-BE49-F238E27FC236}">
+                <a16:creationId xmlns:a16="http://schemas.microsoft.com/office/drawing/2014/main" id="{6753252F-4873-4F63-801D-CC719279A7D5}"/>
+              </a:ext>
+              <a:ext uri="{C183D7F6-B498-43B3-948B-1728B52AA6E4}">
+                <adec:decorative xmlns:adec="http://schemas.microsoft.com/office/drawing/2017/decorative" val="1"/>
+              </a:ext>
+            </a:extLst>
+          </p:cNvPr>
+          <p:cNvSpPr>
+            <a:spLocks noGrp="1" noRot="1" noChangeAspect="1" noMove="1" noResize="1" noEditPoints="1" noAdjustHandles="1" noChangeArrowheads="1" noChangeShapeType="1" noTextEdit="1"/>
+          </p:cNvSpPr>
+          <p:nvPr>
+            <p:extLst>
+              <p:ext uri="{386F3935-93C4-4BCD-93E2-E3B085C9AB24}">
+                <p16:designElem xmlns:p16="http://schemas.microsoft.com/office/powerpoint/2015/main" val="1"/>
+              </p:ext>
+            </p:extLst>
+          </p:nvPr>
+        </p:nvSpPr>
+        <p:spPr>
+          <a:xfrm>
+            <a:off x="0" y="0"/>
+            <a:ext cx="12192000" cy="6858000"/>
+          </a:xfrm>
+          <a:prstGeom prst="rect">
+            <a:avLst/>
+          </a:prstGeom>
+          <a:solidFill>
+            <a:srgbClr val="FFFFFF"/>
+          </a:solidFill>
+          <a:ln>
+            <a:noFill/>
+          </a:ln>
+        </p:spPr>
+        <p:style>
+          <a:lnRef idx="2">
+            <a:schemeClr val="accent1">
+              <a:shade val="50000"/>
+            </a:schemeClr>
+          </a:lnRef>
+          <a:fillRef idx="1">
+            <a:schemeClr val="accent1"/>
+          </a:fillRef>
+          <a:effectRef idx="0">
+            <a:schemeClr val="accent1"/>
+          </a:effectRef>
+          <a:fontRef idx="minor">
+            <a:schemeClr val="lt1"/>
+          </a:fontRef>
+        </p:style>
+        <p:txBody>
+          <a:bodyPr rtlCol="0" anchor="ctr"/>
+          <a:lstStyle/>
+          <a:p>
+            <a:pPr algn="ctr"/>
+            <a:endParaRPr lang="en-US"/>
+          </a:p>
+        </p:txBody>
+      </p:sp>
+      <p:sp>
+        <p:nvSpPr>
+          <p:cNvPr id="11" name="Rectangle 10">
+            <a:extLst>
+              <a:ext uri="{FF2B5EF4-FFF2-40B4-BE49-F238E27FC236}">
+                <a16:creationId xmlns:a16="http://schemas.microsoft.com/office/drawing/2014/main" id="{047C8CCB-F95D-4249-92DD-651249D3535A}"/>
+              </a:ext>
+              <a:ext uri="{C183D7F6-B498-43B3-948B-1728B52AA6E4}">
+                <adec:decorative xmlns:adec="http://schemas.microsoft.com/office/drawing/2017/decorative" val="1"/>
+              </a:ext>
+            </a:extLst>
+          </p:cNvPr>
+          <p:cNvSpPr>
+            <a:spLocks noGrp="1" noRot="1" noChangeAspect="1" noMove="1" noResize="1" noEditPoints="1" noAdjustHandles="1" noChangeArrowheads="1" noChangeShapeType="1" noTextEdit="1"/>
+          </p:cNvSpPr>
+          <p:nvPr>
+            <p:extLst>
+              <p:ext uri="{386F3935-93C4-4BCD-93E2-E3B085C9AB24}">
+                <p16:designElem xmlns:p16="http://schemas.microsoft.com/office/powerpoint/2015/main" val="1"/>
+              </p:ext>
+            </p:extLst>
+          </p:nvPr>
+        </p:nvSpPr>
+        <p:spPr>
+          <a:xfrm>
+            <a:off x="0" y="0"/>
+            <a:ext cx="2013557" cy="6858000"/>
+          </a:xfrm>
+          <a:prstGeom prst="rect">
+            <a:avLst/>
+          </a:prstGeom>
+          <a:solidFill>
+            <a:srgbClr val="525039"/>
+          </a:solidFill>
+          <a:ln>
+            <a:noFill/>
+          </a:ln>
+        </p:spPr>
+        <p:style>
+          <a:lnRef idx="2">
+            <a:schemeClr val="accent1">
+              <a:shade val="50000"/>
+            </a:schemeClr>
+          </a:lnRef>
+          <a:fillRef idx="1">
+            <a:schemeClr val="accent1"/>
+          </a:fillRef>
+          <a:effectRef idx="0">
+            <a:schemeClr val="accent1"/>
+          </a:effectRef>
+          <a:fontRef idx="minor">
+            <a:schemeClr val="lt1"/>
+          </a:fontRef>
+        </p:style>
+        <p:txBody>
+          <a:bodyPr rtlCol="0" anchor="ctr"/>
+          <a:lstStyle/>
+          <a:p>
+            <a:pPr algn="ctr"/>
+            <a:endParaRPr lang="en-US"/>
+          </a:p>
+        </p:txBody>
+      </p:sp>
+      <p:sp>
+        <p:nvSpPr>
+          <p:cNvPr id="2" name="Title 1">
+            <a:extLst>
+              <a:ext uri="{FF2B5EF4-FFF2-40B4-BE49-F238E27FC236}">
+                <a16:creationId xmlns:a16="http://schemas.microsoft.com/office/drawing/2014/main" id="{2AF0A8CC-054C-4246-8CF9-2ABE89E0A880}"/>
+              </a:ext>
+            </a:extLst>
+          </p:cNvPr>
+          <p:cNvSpPr>
+            <a:spLocks noGrp="1"/>
+          </p:cNvSpPr>
+          <p:nvPr>
+            <p:ph type="title"/>
+          </p:nvPr>
+        </p:nvSpPr>
+        <p:spPr>
+          <a:xfrm>
+            <a:off x="640080" y="2074363"/>
+            <a:ext cx="2752354" cy="2709275"/>
+          </a:xfrm>
+          <a:prstGeom prst="ellipse">
+            <a:avLst/>
+          </a:prstGeom>
+          <a:solidFill>
+            <a:srgbClr val="262626"/>
+          </a:solidFill>
+          <a:ln w="174625" cmpd="thinThick">
+            <a:solidFill>
+              <a:srgbClr val="262626"/>
+            </a:solidFill>
+          </a:ln>
+        </p:spPr>
+        <p:txBody>
+          <a:bodyPr vert="horz" lIns="91440" tIns="45720" rIns="91440" bIns="45720" rtlCol="0" anchor="ctr">
+            <a:normAutofit/>
+          </a:bodyPr>
+          <a:lstStyle/>
+          <a:p>
+            <a:pPr algn="ctr"/>
+            <a:r>
+              <a:rPr lang="en-US" sz="2600" kern="1200">
+                <a:solidFill>
+                  <a:srgbClr val="FFFFFF"/>
+                </a:solidFill>
+                <a:latin typeface="+mj-lt"/>
+                <a:ea typeface="+mj-ea"/>
+                <a:cs typeface="+mj-cs"/>
+              </a:rPr>
+              <a:t>Stay-points</a:t>
+            </a:r>
+          </a:p>
+        </p:txBody>
+      </p:sp>
+      <p:pic>
+        <p:nvPicPr>
+          <p:cNvPr id="4" name="Picture 3">
+            <a:extLst>
+              <a:ext uri="{FF2B5EF4-FFF2-40B4-BE49-F238E27FC236}">
+                <a16:creationId xmlns:a16="http://schemas.microsoft.com/office/drawing/2014/main" id="{17EA5BD2-105F-48ED-9824-63B559F09E92}"/>
+              </a:ext>
+            </a:extLst>
+          </p:cNvPr>
+          <p:cNvPicPr/>
+          <p:nvPr/>
+        </p:nvPicPr>
+        <p:blipFill>
+          <a:blip r:embed="rId2">
+            <a:extLst>
+              <a:ext uri="{28A0092B-C50C-407E-A947-70E740481C1C}">
+                <a14:useLocalDpi xmlns:a14="http://schemas.microsoft.com/office/drawing/2010/main" val="0"/>
+              </a:ext>
+            </a:extLst>
+          </a:blip>
+          <a:srcRect/>
+          <a:stretch>
+            <a:fillRect/>
+          </a:stretch>
+        </p:blipFill>
+        <p:spPr bwMode="auto">
+          <a:xfrm>
+            <a:off x="4032514" y="371475"/>
+            <a:ext cx="7519406" cy="6296025"/>
+          </a:xfrm>
+          <a:prstGeom prst="rect">
+            <a:avLst/>
+          </a:prstGeom>
+          <a:noFill/>
+        </p:spPr>
+      </p:pic>
+    </p:spTree>
+    <p:extLst>
+      <p:ext uri="{BB962C8B-B14F-4D97-AF65-F5344CB8AC3E}">
+        <p14:creationId xmlns:p14="http://schemas.microsoft.com/office/powerpoint/2010/main" val="4254928547"/>
+      </p:ext>
+    </p:extLst>
+  </p:cSld>
+  <p:clrMapOvr>
+    <a:masterClrMapping/>
+  </p:clrMapOvr>
+</p:sld>
+</file>
+
+<file path=ppt/slides/slide9.xml><?xml version="1.0" encoding="utf-8"?>
+<p:sld xmlns:a="http://schemas.openxmlformats.org/drawingml/2006/main" xmlns:r="http://schemas.openxmlformats.org/officeDocument/2006/relationships" xmlns:p="http://schemas.openxmlformats.org/presentationml/2006/main">
+  <p:cSld>
+    <p:bg>
+      <p:bgPr>
+        <a:solidFill>
+          <a:schemeClr val="bg1"/>
+        </a:solidFill>
+        <a:effectLst/>
+      </p:bgPr>
+    </p:bg>
+    <p:spTree>
+      <p:nvGrpSpPr>
+        <p:cNvPr id="1" name=""/>
+        <p:cNvGrpSpPr/>
+        <p:nvPr/>
+      </p:nvGrpSpPr>
+      <p:grpSpPr>
+        <a:xfrm>
+          <a:off x="0" y="0"/>
+          <a:ext cx="0" cy="0"/>
+          <a:chOff x="0" y="0"/>
+          <a:chExt cx="0" cy="0"/>
+        </a:xfrm>
+      </p:grpSpPr>
+      <p:sp>
+        <p:nvSpPr>
+          <p:cNvPr id="9" name="Rectangle 8">
+            <a:extLst>
+              <a:ext uri="{FF2B5EF4-FFF2-40B4-BE49-F238E27FC236}">
+                <a16:creationId xmlns:a16="http://schemas.microsoft.com/office/drawing/2014/main" id="{6753252F-4873-4F63-801D-CC719279A7D5}"/>
+              </a:ext>
+              <a:ext uri="{C183D7F6-B498-43B3-948B-1728B52AA6E4}">
+                <adec:decorative xmlns:adec="http://schemas.microsoft.com/office/drawing/2017/decorative" val="1"/>
+              </a:ext>
+            </a:extLst>
+          </p:cNvPr>
+          <p:cNvSpPr>
+            <a:spLocks noGrp="1" noRot="1" noChangeAspect="1" noMove="1" noResize="1" noEditPoints="1" noAdjustHandles="1" noChangeArrowheads="1" noChangeShapeType="1" noTextEdit="1"/>
+          </p:cNvSpPr>
+          <p:nvPr>
+            <p:extLst>
+              <p:ext uri="{386F3935-93C4-4BCD-93E2-E3B085C9AB24}">
+                <p16:designElem xmlns:p16="http://schemas.microsoft.com/office/powerpoint/2015/main" val="1"/>
+              </p:ext>
+            </p:extLst>
+          </p:nvPr>
+        </p:nvSpPr>
+        <p:spPr>
+          <a:xfrm>
+            <a:off x="0" y="0"/>
+            <a:ext cx="12192000" cy="6858000"/>
+          </a:xfrm>
+          <a:prstGeom prst="rect">
+            <a:avLst/>
+          </a:prstGeom>
+          <a:solidFill>
+            <a:srgbClr val="FFFFFF"/>
+          </a:solidFill>
+          <a:ln>
+            <a:noFill/>
+          </a:ln>
+        </p:spPr>
+        <p:style>
+          <a:lnRef idx="2">
+            <a:schemeClr val="accent1">
+              <a:shade val="50000"/>
+            </a:schemeClr>
+          </a:lnRef>
+          <a:fillRef idx="1">
+            <a:schemeClr val="accent1"/>
+          </a:fillRef>
+          <a:effectRef idx="0">
+            <a:schemeClr val="accent1"/>
+          </a:effectRef>
+          <a:fontRef idx="minor">
+            <a:schemeClr val="lt1"/>
+          </a:fontRef>
+        </p:style>
+        <p:txBody>
+          <a:bodyPr rtlCol="0" anchor="ctr"/>
+          <a:lstStyle/>
+          <a:p>
+            <a:pPr algn="ctr"/>
+            <a:endParaRPr lang="en-US"/>
+          </a:p>
+        </p:txBody>
+      </p:sp>
+      <p:sp>
+        <p:nvSpPr>
+          <p:cNvPr id="11" name="Rectangle 10">
+            <a:extLst>
+              <a:ext uri="{FF2B5EF4-FFF2-40B4-BE49-F238E27FC236}">
+                <a16:creationId xmlns:a16="http://schemas.microsoft.com/office/drawing/2014/main" id="{047C8CCB-F95D-4249-92DD-651249D3535A}"/>
+              </a:ext>
+              <a:ext uri="{C183D7F6-B498-43B3-948B-1728B52AA6E4}">
+                <adec:decorative xmlns:adec="http://schemas.microsoft.com/office/drawing/2017/decorative" val="1"/>
+              </a:ext>
+            </a:extLst>
+          </p:cNvPr>
+          <p:cNvSpPr>
+            <a:spLocks noGrp="1" noRot="1" noChangeAspect="1" noMove="1" noResize="1" noEditPoints="1" noAdjustHandles="1" noChangeArrowheads="1" noChangeShapeType="1" noTextEdit="1"/>
+          </p:cNvSpPr>
+          <p:nvPr>
+            <p:extLst>
+              <p:ext uri="{386F3935-93C4-4BCD-93E2-E3B085C9AB24}">
+                <p16:designElem xmlns:p16="http://schemas.microsoft.com/office/powerpoint/2015/main" val="1"/>
+              </p:ext>
+            </p:extLst>
+          </p:nvPr>
+        </p:nvSpPr>
+        <p:spPr>
+          <a:xfrm>
+            <a:off x="0" y="0"/>
+            <a:ext cx="2013557" cy="6858000"/>
+          </a:xfrm>
+          <a:prstGeom prst="rect">
+            <a:avLst/>
+          </a:prstGeom>
+          <a:solidFill>
+            <a:srgbClr val="7F7F7F"/>
+          </a:solidFill>
+          <a:ln>
+            <a:noFill/>
+          </a:ln>
+        </p:spPr>
+        <p:style>
+          <a:lnRef idx="2">
+            <a:schemeClr val="accent1">
+              <a:shade val="50000"/>
+            </a:schemeClr>
+          </a:lnRef>
+          <a:fillRef idx="1">
+            <a:schemeClr val="accent1"/>
+          </a:fillRef>
+          <a:effectRef idx="0">
+            <a:schemeClr val="accent1"/>
+          </a:effectRef>
+          <a:fontRef idx="minor">
+            <a:schemeClr val="lt1"/>
+          </a:fontRef>
+        </p:style>
+        <p:txBody>
+          <a:bodyPr rtlCol="0" anchor="ctr"/>
+          <a:lstStyle/>
+          <a:p>
+            <a:pPr algn="ctr"/>
+            <a:endParaRPr lang="en-US"/>
+          </a:p>
+        </p:txBody>
+      </p:sp>
+      <p:sp>
+        <p:nvSpPr>
+          <p:cNvPr id="2" name="Title 1">
+            <a:extLst>
+              <a:ext uri="{FF2B5EF4-FFF2-40B4-BE49-F238E27FC236}">
+                <a16:creationId xmlns:a16="http://schemas.microsoft.com/office/drawing/2014/main" id="{206F3CD4-9ADD-4954-A7D2-D931B588D16E}"/>
+              </a:ext>
+            </a:extLst>
+          </p:cNvPr>
+          <p:cNvSpPr>
+            <a:spLocks noGrp="1"/>
+          </p:cNvSpPr>
+          <p:nvPr>
+            <p:ph type="title"/>
+          </p:nvPr>
+        </p:nvSpPr>
+        <p:spPr>
+          <a:xfrm>
+            <a:off x="640080" y="2074363"/>
+            <a:ext cx="2752354" cy="2709275"/>
+          </a:xfrm>
+          <a:prstGeom prst="ellipse">
+            <a:avLst/>
+          </a:prstGeom>
+          <a:solidFill>
+            <a:srgbClr val="262626"/>
+          </a:solidFill>
+          <a:ln w="174625" cmpd="thinThick">
+            <a:solidFill>
+              <a:srgbClr val="262626"/>
+            </a:solidFill>
+          </a:ln>
+        </p:spPr>
+        <p:txBody>
+          <a:bodyPr vert="horz" lIns="91440" tIns="45720" rIns="91440" bIns="45720" rtlCol="0" anchor="ctr">
+            <a:normAutofit/>
+          </a:bodyPr>
+          <a:lstStyle/>
+          <a:p>
+            <a:pPr algn="ctr"/>
+            <a:r>
+              <a:rPr lang="en-US" sz="2600" kern="1200">
+                <a:solidFill>
+                  <a:srgbClr val="FFFFFF"/>
+                </a:solidFill>
+                <a:latin typeface="+mj-lt"/>
+                <a:ea typeface="+mj-ea"/>
+                <a:cs typeface="+mj-cs"/>
+              </a:rPr>
+              <a:t>States</a:t>
+            </a:r>
+          </a:p>
+        </p:txBody>
+      </p:sp>
+      <p:pic>
+        <p:nvPicPr>
+          <p:cNvPr id="4" name="Picture 3">
+            <a:extLst>
+              <a:ext uri="{FF2B5EF4-FFF2-40B4-BE49-F238E27FC236}">
+                <a16:creationId xmlns:a16="http://schemas.microsoft.com/office/drawing/2014/main" id="{5580A3E0-799F-415D-8BF2-56C04C988488}"/>
+              </a:ext>
+            </a:extLst>
+          </p:cNvPr>
+          <p:cNvPicPr/>
+          <p:nvPr/>
+        </p:nvPicPr>
+        <p:blipFill>
+          <a:blip r:embed="rId2"/>
+          <a:stretch>
+            <a:fillRect/>
+          </a:stretch>
+        </p:blipFill>
+        <p:spPr>
+          <a:xfrm>
+            <a:off x="3705225" y="1304925"/>
+            <a:ext cx="7846695" cy="4495799"/>
+          </a:xfrm>
+          <a:prstGeom prst="rect">
+            <a:avLst/>
+          </a:prstGeom>
+        </p:spPr>
+      </p:pic>
+    </p:spTree>
+    <p:extLst>
+      <p:ext uri="{BB962C8B-B14F-4D97-AF65-F5344CB8AC3E}">
+        <p14:creationId xmlns:p14="http://schemas.microsoft.com/office/powerpoint/2010/main" val="3629377986"/>
       </p:ext>
     </p:extLst>
   </p:cSld>

</xml_diff>